<commit_message>
Presentation done untill Results
</commit_message>
<xml_diff>
--- a/Plots/Drug Review.pptx
+++ b/Plots/Drug Review.pptx
@@ -10,7 +10,23 @@
     <p:sldId id="258" r:id="rId4"/>
     <p:sldId id="259" r:id="rId5"/>
     <p:sldId id="260" r:id="rId6"/>
-    <p:sldId id="261" r:id="rId7"/>
+    <p:sldId id="265" r:id="rId7"/>
+    <p:sldId id="261" r:id="rId8"/>
+    <p:sldId id="262" r:id="rId9"/>
+    <p:sldId id="263" r:id="rId10"/>
+    <p:sldId id="264" r:id="rId11"/>
+    <p:sldId id="266" r:id="rId12"/>
+    <p:sldId id="267" r:id="rId13"/>
+    <p:sldId id="268" r:id="rId14"/>
+    <p:sldId id="269" r:id="rId15"/>
+    <p:sldId id="270" r:id="rId16"/>
+    <p:sldId id="271" r:id="rId17"/>
+    <p:sldId id="272" r:id="rId18"/>
+    <p:sldId id="274" r:id="rId19"/>
+    <p:sldId id="275" r:id="rId20"/>
+    <p:sldId id="276" r:id="rId21"/>
+    <p:sldId id="277" r:id="rId22"/>
+    <p:sldId id="278" r:id="rId23"/>
   </p:sldIdLst>
   <p:sldSz cx="12192000" cy="6858000"/>
   <p:notesSz cx="6858000" cy="9144000"/>
@@ -109,6 +125,11 @@
       </a:defRPr>
     </a:lvl9pPr>
   </p:defaultTextStyle>
+  <p:extLst>
+    <p:ext uri="{EFAFB233-063F-42B5-8137-9DF3F51BA10A}">
+      <p15:sldGuideLst xmlns:p15="http://schemas.microsoft.com/office/powerpoint/2012/main"/>
+    </p:ext>
+  </p:extLst>
 </p:presentation>
 </file>
 
@@ -1216,7 +1237,7 @@
       <dsp:spPr>
         <a:xfrm>
           <a:off x="0" y="479"/>
-          <a:ext cx="9486690" cy="1121483"/>
+          <a:ext cx="9486899" cy="1121408"/>
         </a:xfrm>
         <a:prstGeom prst="roundRect">
           <a:avLst>
@@ -1257,8 +1278,8 @@
       </dsp:nvSpPr>
       <dsp:spPr>
         <a:xfrm>
-          <a:off x="339248" y="252813"/>
-          <a:ext cx="616816" cy="616816"/>
+          <a:off x="339225" y="252796"/>
+          <a:ext cx="616774" cy="616774"/>
         </a:xfrm>
         <a:prstGeom prst="rect">
           <a:avLst/>
@@ -1314,8 +1335,8 @@
       </dsp:nvSpPr>
       <dsp:spPr>
         <a:xfrm>
-          <a:off x="1295313" y="479"/>
-          <a:ext cx="8191376" cy="1121483"/>
+          <a:off x="1295226" y="479"/>
+          <a:ext cx="8191673" cy="1121408"/>
         </a:xfrm>
         <a:prstGeom prst="rect">
           <a:avLst/>
@@ -1339,7 +1360,7 @@
         <a:fontRef idx="minor"/>
       </dsp:style>
       <dsp:txBody>
-        <a:bodyPr spcFirstLastPara="0" vert="horz" wrap="square" lIns="118690" tIns="118690" rIns="118690" bIns="118690" numCol="1" spcCol="1270" anchor="ctr" anchorCtr="0">
+        <a:bodyPr spcFirstLastPara="0" vert="horz" wrap="square" lIns="118682" tIns="118682" rIns="118682" bIns="118682" numCol="1" spcCol="1270" anchor="ctr" anchorCtr="0">
           <a:noAutofit/>
         </a:bodyPr>
         <a:lstStyle/>
@@ -1367,8 +1388,8 @@
         </a:p>
       </dsp:txBody>
       <dsp:txXfrm>
-        <a:off x="1295313" y="479"/>
-        <a:ext cx="8191376" cy="1121483"/>
+        <a:off x="1295226" y="479"/>
+        <a:ext cx="8191673" cy="1121408"/>
       </dsp:txXfrm>
     </dsp:sp>
     <dsp:sp modelId="{61D27D4C-039F-4AD8-9986-389A45D58033}">
@@ -1378,8 +1399,8 @@
       </dsp:nvSpPr>
       <dsp:spPr>
         <a:xfrm>
-          <a:off x="0" y="1402334"/>
-          <a:ext cx="9486690" cy="1121483"/>
+          <a:off x="0" y="1402239"/>
+          <a:ext cx="9486899" cy="1121408"/>
         </a:xfrm>
         <a:prstGeom prst="roundRect">
           <a:avLst>
@@ -1420,8 +1441,8 @@
       </dsp:nvSpPr>
       <dsp:spPr>
         <a:xfrm>
-          <a:off x="339248" y="1654667"/>
-          <a:ext cx="616816" cy="616816"/>
+          <a:off x="339225" y="1654556"/>
+          <a:ext cx="616774" cy="616774"/>
         </a:xfrm>
         <a:prstGeom prst="rect">
           <a:avLst/>
@@ -1477,8 +1498,8 @@
       </dsp:nvSpPr>
       <dsp:spPr>
         <a:xfrm>
-          <a:off x="1295313" y="1402334"/>
-          <a:ext cx="8191376" cy="1121483"/>
+          <a:off x="1295226" y="1402239"/>
+          <a:ext cx="8191673" cy="1121408"/>
         </a:xfrm>
         <a:prstGeom prst="rect">
           <a:avLst/>
@@ -1502,7 +1523,7 @@
         <a:fontRef idx="minor"/>
       </dsp:style>
       <dsp:txBody>
-        <a:bodyPr spcFirstLastPara="0" vert="horz" wrap="square" lIns="118690" tIns="118690" rIns="118690" bIns="118690" numCol="1" spcCol="1270" anchor="ctr" anchorCtr="0">
+        <a:bodyPr spcFirstLastPara="0" vert="horz" wrap="square" lIns="118682" tIns="118682" rIns="118682" bIns="118682" numCol="1" spcCol="1270" anchor="ctr" anchorCtr="0">
           <a:noAutofit/>
         </a:bodyPr>
         <a:lstStyle/>
@@ -1530,8 +1551,8 @@
         </a:p>
       </dsp:txBody>
       <dsp:txXfrm>
-        <a:off x="1295313" y="1402334"/>
-        <a:ext cx="8191376" cy="1121483"/>
+        <a:off x="1295226" y="1402239"/>
+        <a:ext cx="8191673" cy="1121408"/>
       </dsp:txXfrm>
     </dsp:sp>
     <dsp:sp modelId="{4ED4AC67-2FF2-409D-A0A9-864A2C73D269}">
@@ -1541,8 +1562,8 @@
       </dsp:nvSpPr>
       <dsp:spPr>
         <a:xfrm>
-          <a:off x="0" y="2804188"/>
-          <a:ext cx="9486690" cy="1121483"/>
+          <a:off x="0" y="2803999"/>
+          <a:ext cx="9486899" cy="1121408"/>
         </a:xfrm>
         <a:prstGeom prst="roundRect">
           <a:avLst>
@@ -1583,8 +1604,8 @@
       </dsp:nvSpPr>
       <dsp:spPr>
         <a:xfrm>
-          <a:off x="339248" y="3056522"/>
-          <a:ext cx="616816" cy="616816"/>
+          <a:off x="339225" y="3056316"/>
+          <a:ext cx="616774" cy="616774"/>
         </a:xfrm>
         <a:prstGeom prst="rect">
           <a:avLst/>
@@ -1640,8 +1661,8 @@
       </dsp:nvSpPr>
       <dsp:spPr>
         <a:xfrm>
-          <a:off x="1295313" y="2804188"/>
-          <a:ext cx="8191376" cy="1121483"/>
+          <a:off x="1295226" y="2803999"/>
+          <a:ext cx="8191673" cy="1121408"/>
         </a:xfrm>
         <a:prstGeom prst="rect">
           <a:avLst/>
@@ -1665,7 +1686,7 @@
         <a:fontRef idx="minor"/>
       </dsp:style>
       <dsp:txBody>
-        <a:bodyPr spcFirstLastPara="0" vert="horz" wrap="square" lIns="118690" tIns="118690" rIns="118690" bIns="118690" numCol="1" spcCol="1270" anchor="ctr" anchorCtr="0">
+        <a:bodyPr spcFirstLastPara="0" vert="horz" wrap="square" lIns="118682" tIns="118682" rIns="118682" bIns="118682" numCol="1" spcCol="1270" anchor="ctr" anchorCtr="0">
           <a:noAutofit/>
         </a:bodyPr>
         <a:lstStyle/>
@@ -1693,8 +1714,8 @@
         </a:p>
       </dsp:txBody>
       <dsp:txXfrm>
-        <a:off x="1295313" y="2804188"/>
-        <a:ext cx="8191376" cy="1121483"/>
+        <a:off x="1295226" y="2803999"/>
+        <a:ext cx="8191673" cy="1121408"/>
       </dsp:txXfrm>
     </dsp:sp>
   </dsp:spTree>
@@ -3344,7 +3365,7 @@
             <a:fld id="{1449AA12-8195-4182-A7AC-2E7E59DFBDAF}" type="datetimeFigureOut">
               <a:rPr lang="en-US" smtClean="0"/>
               <a:pPr algn="r"/>
-              <a:t>8/24/23</a:t>
+              <a:t>8/25/23</a:t>
             </a:fld>
             <a:endParaRPr lang="en-US"/>
           </a:p>
@@ -3560,7 +3581,7 @@
           <a:p>
             <a:fld id="{1449AA12-8195-4182-A7AC-2E7E59DFBDAF}" type="datetimeFigureOut">
               <a:rPr lang="en-US" smtClean="0"/>
-              <a:t>8/24/23</a:t>
+              <a:t>8/25/23</a:t>
             </a:fld>
             <a:endParaRPr lang="en-US"/>
           </a:p>
@@ -3932,7 +3953,7 @@
           <a:p>
             <a:fld id="{1449AA12-8195-4182-A7AC-2E7E59DFBDAF}" type="datetimeFigureOut">
               <a:rPr lang="en-US" smtClean="0"/>
-              <a:t>8/24/23</a:t>
+              <a:t>8/25/23</a:t>
             </a:fld>
             <a:endParaRPr lang="en-US"/>
           </a:p>
@@ -4294,7 +4315,7 @@
           <a:p>
             <a:fld id="{1449AA12-8195-4182-A7AC-2E7E59DFBDAF}" type="datetimeFigureOut">
               <a:rPr lang="en-US" smtClean="0"/>
-              <a:t>8/24/23</a:t>
+              <a:t>8/25/23</a:t>
             </a:fld>
             <a:endParaRPr lang="en-US"/>
           </a:p>
@@ -4734,7 +4755,7 @@
           <a:p>
             <a:fld id="{1449AA12-8195-4182-A7AC-2E7E59DFBDAF}" type="datetimeFigureOut">
               <a:rPr lang="en-US" smtClean="0"/>
-              <a:t>8/24/23</a:t>
+              <a:t>8/25/23</a:t>
             </a:fld>
             <a:endParaRPr lang="en-US"/>
           </a:p>
@@ -5174,7 +5195,7 @@
           <a:p>
             <a:fld id="{1449AA12-8195-4182-A7AC-2E7E59DFBDAF}" type="datetimeFigureOut">
               <a:rPr lang="en-US" smtClean="0"/>
-              <a:t>8/24/23</a:t>
+              <a:t>8/25/23</a:t>
             </a:fld>
             <a:endParaRPr lang="en-US"/>
           </a:p>
@@ -5782,7 +5803,7 @@
           <a:p>
             <a:fld id="{1449AA12-8195-4182-A7AC-2E7E59DFBDAF}" type="datetimeFigureOut">
               <a:rPr lang="en-US" smtClean="0"/>
-              <a:t>8/24/23</a:t>
+              <a:t>8/25/23</a:t>
             </a:fld>
             <a:endParaRPr lang="en-US"/>
           </a:p>
@@ -6087,7 +6108,7 @@
           <a:p>
             <a:fld id="{1449AA12-8195-4182-A7AC-2E7E59DFBDAF}" type="datetimeFigureOut">
               <a:rPr lang="en-US" smtClean="0"/>
-              <a:t>8/24/23</a:t>
+              <a:t>8/25/23</a:t>
             </a:fld>
             <a:endParaRPr lang="en-US"/>
           </a:p>
@@ -6364,7 +6385,7 @@
           <a:p>
             <a:fld id="{1449AA12-8195-4182-A7AC-2E7E59DFBDAF}" type="datetimeFigureOut">
               <a:rPr lang="en-US" smtClean="0"/>
-              <a:t>8/24/23</a:t>
+              <a:t>8/25/23</a:t>
             </a:fld>
             <a:endParaRPr lang="en-US"/>
           </a:p>
@@ -6841,7 +6862,7 @@
           <a:p>
             <a:fld id="{1449AA12-8195-4182-A7AC-2E7E59DFBDAF}" type="datetimeFigureOut">
               <a:rPr lang="en-US" smtClean="0"/>
-              <a:t>8/24/23</a:t>
+              <a:t>8/25/23</a:t>
             </a:fld>
             <a:endParaRPr lang="en-US"/>
           </a:p>
@@ -7296,7 +7317,7 @@
           <a:p>
             <a:fld id="{1449AA12-8195-4182-A7AC-2E7E59DFBDAF}" type="datetimeFigureOut">
               <a:rPr lang="en-US" smtClean="0"/>
-              <a:t>8/24/23</a:t>
+              <a:t>8/25/23</a:t>
             </a:fld>
             <a:endParaRPr lang="en-US"/>
           </a:p>
@@ -7702,7 +7723,7 @@
             <a:fld id="{1449AA12-8195-4182-A7AC-2E7E59DFBDAF}" type="datetimeFigureOut">
               <a:rPr lang="en-US" smtClean="0"/>
               <a:pPr/>
-              <a:t>8/24/23</a:t>
+              <a:t>8/25/23</a:t>
             </a:fld>
             <a:endParaRPr lang="en-US"/>
           </a:p>
@@ -8143,66 +8164,6 @@
           <a:chExt cx="0" cy="0"/>
         </a:xfrm>
       </p:grpSpPr>
-      <p:sp useBgFill="1">
-        <p:nvSpPr>
-          <p:cNvPr id="27" name="Rectangle 19">
-            <a:extLst>
-              <a:ext uri="{FF2B5EF4-FFF2-40B4-BE49-F238E27FC236}">
-                <a16:creationId xmlns:a16="http://schemas.microsoft.com/office/drawing/2014/main" id="{A88F843D-1C1B-C740-AC27-E3238D0F5F47}"/>
-              </a:ext>
-              <a:ext uri="{C183D7F6-B498-43B3-948B-1728B52AA6E4}">
-                <adec:decorative xmlns:adec="http://schemas.microsoft.com/office/drawing/2017/decorative" val="1"/>
-              </a:ext>
-            </a:extLst>
-          </p:cNvPr>
-          <p:cNvSpPr>
-            <a:spLocks noGrp="1" noRot="1" noChangeAspect="1" noMove="1" noResize="1" noEditPoints="1" noAdjustHandles="1" noChangeArrowheads="1" noChangeShapeType="1" noTextEdit="1"/>
-          </p:cNvSpPr>
-          <p:nvPr>
-            <p:extLst>
-              <p:ext uri="{386F3935-93C4-4BCD-93E2-E3B085C9AB24}">
-                <p16:designElem xmlns:p16="http://schemas.microsoft.com/office/powerpoint/2015/main" val="1"/>
-              </p:ext>
-            </p:extLst>
-          </p:nvPr>
-        </p:nvSpPr>
-        <p:spPr>
-          <a:xfrm>
-            <a:off x="0" y="0"/>
-            <a:ext cx="12188952" cy="6858000"/>
-          </a:xfrm>
-          <a:prstGeom prst="rect">
-            <a:avLst/>
-          </a:prstGeom>
-          <a:ln>
-            <a:noFill/>
-          </a:ln>
-        </p:spPr>
-        <p:style>
-          <a:lnRef idx="2">
-            <a:schemeClr val="accent1">
-              <a:shade val="50000"/>
-            </a:schemeClr>
-          </a:lnRef>
-          <a:fillRef idx="1">
-            <a:schemeClr val="accent1"/>
-          </a:fillRef>
-          <a:effectRef idx="0">
-            <a:schemeClr val="accent1"/>
-          </a:effectRef>
-          <a:fontRef idx="minor">
-            <a:schemeClr val="lt1"/>
-          </a:fontRef>
-        </p:style>
-        <p:txBody>
-          <a:bodyPr rtlCol="0" anchor="ctr"/>
-          <a:lstStyle/>
-          <a:p>
-            <a:pPr algn="ctr"/>
-            <a:endParaRPr lang="en-US"/>
-          </a:p>
-        </p:txBody>
-      </p:sp>
       <p:pic>
         <p:nvPicPr>
           <p:cNvPr id="4" name="Picture 3" descr="An abstract genetic concept">
@@ -8234,60 +8195,6 @@
       </p:pic>
       <p:sp>
         <p:nvSpPr>
-          <p:cNvPr id="28" name="Rectangle">
-            <a:extLst>
-              <a:ext uri="{FF2B5EF4-FFF2-40B4-BE49-F238E27FC236}">
-                <a16:creationId xmlns:a16="http://schemas.microsoft.com/office/drawing/2014/main" id="{9F0EA5A9-0D12-3644-BBEC-6D9D192EBEF4}"/>
-              </a:ext>
-              <a:ext uri="{C183D7F6-B498-43B3-948B-1728B52AA6E4}">
-                <adec:decorative xmlns:adec="http://schemas.microsoft.com/office/drawing/2017/decorative" val="1"/>
-              </a:ext>
-            </a:extLst>
-          </p:cNvPr>
-          <p:cNvSpPr>
-            <a:spLocks noGrp="1" noRot="1" noChangeAspect="1" noMove="1" noResize="1" noEditPoints="1" noAdjustHandles="1" noChangeArrowheads="1" noChangeShapeType="1" noTextEdit="1"/>
-          </p:cNvSpPr>
-          <p:nvPr>
-            <p:extLst>
-              <p:ext uri="{386F3935-93C4-4BCD-93E2-E3B085C9AB24}">
-                <p16:designElem xmlns:p16="http://schemas.microsoft.com/office/powerpoint/2015/main" val="1"/>
-              </p:ext>
-            </p:extLst>
-          </p:nvPr>
-        </p:nvSpPr>
-        <p:spPr>
-          <a:xfrm>
-            <a:off x="0" y="-1"/>
-            <a:ext cx="4755908" cy="6858001"/>
-          </a:xfrm>
-          <a:prstGeom prst="rect">
-            <a:avLst/>
-          </a:prstGeom>
-          <a:solidFill>
-            <a:schemeClr val="bg1">
-              <a:alpha val="85000"/>
-            </a:schemeClr>
-          </a:solidFill>
-          <a:ln w="12700">
-            <a:miter lim="400000"/>
-          </a:ln>
-        </p:spPr>
-        <p:txBody>
-          <a:bodyPr lIns="50800" tIns="50800" rIns="50800" bIns="50800" anchor="ctr"/>
-          <a:lstStyle/>
-          <a:p>
-            <a:pPr algn="ctr" defTabSz="457200"/>
-            <a:endParaRPr sz="2600" cap="all" dirty="0">
-              <a:solidFill>
-                <a:srgbClr val="FFFFFF"/>
-              </a:solidFill>
-              <a:sym typeface="Avenir Next"/>
-            </a:endParaRPr>
-          </a:p>
-        </p:txBody>
-      </p:sp>
-      <p:sp>
-        <p:nvSpPr>
           <p:cNvPr id="2" name="Title 1">
             <a:extLst>
               <a:ext uri="{FF2B5EF4-FFF2-40B4-BE49-F238E27FC236}">
@@ -8358,196 +8265,1155 @@
           </a:p>
         </p:txBody>
       </p:sp>
-      <p:sp>
-        <p:nvSpPr>
-          <p:cNvPr id="29" name="Rectangle 23">
-            <a:extLst>
-              <a:ext uri="{FF2B5EF4-FFF2-40B4-BE49-F238E27FC236}">
-                <a16:creationId xmlns:a16="http://schemas.microsoft.com/office/drawing/2014/main" id="{A21C8291-E3D5-4240-8FF4-E5213CBCC453}"/>
-              </a:ext>
-              <a:ext uri="{C183D7F6-B498-43B3-948B-1728B52AA6E4}">
-                <adec:decorative xmlns:adec="http://schemas.microsoft.com/office/drawing/2017/decorative" val="1"/>
-              </a:ext>
-            </a:extLst>
-          </p:cNvPr>
-          <p:cNvSpPr>
-            <a:spLocks noGrp="1" noRot="1" noChangeAspect="1" noMove="1" noResize="1" noEditPoints="1" noAdjustHandles="1" noChangeArrowheads="1" noChangeShapeType="1" noTextEdit="1"/>
-          </p:cNvSpPr>
-          <p:nvPr>
-            <p:extLst>
-              <p:ext uri="{386F3935-93C4-4BCD-93E2-E3B085C9AB24}">
-                <p16:designElem xmlns:p16="http://schemas.microsoft.com/office/powerpoint/2015/main" val="1"/>
-              </p:ext>
-            </p:extLst>
-          </p:nvPr>
-        </p:nvSpPr>
+    </p:spTree>
+    <p:extLst>
+      <p:ext uri="{BB962C8B-B14F-4D97-AF65-F5344CB8AC3E}">
+        <p14:creationId xmlns:p14="http://schemas.microsoft.com/office/powerpoint/2010/main" val="3917815640"/>
+      </p:ext>
+    </p:extLst>
+  </p:cSld>
+  <p:clrMapOvr>
+    <a:masterClrMapping/>
+  </p:clrMapOvr>
+</p:sld>
+</file>
+
+<file path=ppt/slides/slide10.xml><?xml version="1.0" encoding="utf-8"?>
+<p:sld xmlns:a="http://schemas.openxmlformats.org/drawingml/2006/main" xmlns:r="http://schemas.openxmlformats.org/officeDocument/2006/relationships" xmlns:p="http://schemas.openxmlformats.org/presentationml/2006/main">
+  <p:cSld>
+    <p:spTree>
+      <p:nvGrpSpPr>
+        <p:cNvPr id="1" name=""/>
+        <p:cNvGrpSpPr/>
+        <p:nvPr/>
+      </p:nvGrpSpPr>
+      <p:grpSpPr>
+        <a:xfrm>
+          <a:off x="0" y="0"/>
+          <a:ext cx="0" cy="0"/>
+          <a:chOff x="0" y="0"/>
+          <a:chExt cx="0" cy="0"/>
+        </a:xfrm>
+      </p:grpSpPr>
+      <p:pic>
+        <p:nvPicPr>
+          <p:cNvPr id="3" name="Picture 2">
+            <a:extLst>
+              <a:ext uri="{FF2B5EF4-FFF2-40B4-BE49-F238E27FC236}">
+                <a16:creationId xmlns:a16="http://schemas.microsoft.com/office/drawing/2014/main" id="{D20829C1-AF73-2BD6-C712-5111A98FD8C3}"/>
+              </a:ext>
+            </a:extLst>
+          </p:cNvPr>
+          <p:cNvPicPr>
+            <a:picLocks noChangeAspect="1"/>
+          </p:cNvPicPr>
+          <p:nvPr/>
+        </p:nvPicPr>
+        <p:blipFill>
+          <a:blip r:embed="rId2"/>
+          <a:stretch>
+            <a:fillRect/>
+          </a:stretch>
+        </p:blipFill>
         <p:spPr>
           <a:xfrm>
-            <a:off x="4740282" y="1375495"/>
-            <a:ext cx="2770698" cy="5482505"/>
+            <a:off x="1520328" y="1688335"/>
+            <a:ext cx="9496539" cy="4095520"/>
           </a:xfrm>
           <a:prstGeom prst="rect">
             <a:avLst/>
           </a:prstGeom>
-          <a:gradFill flip="none" rotWithShape="1">
-            <a:gsLst>
-              <a:gs pos="0">
-                <a:schemeClr val="accent1">
-                  <a:alpha val="50000"/>
-                </a:schemeClr>
-              </a:gs>
-              <a:gs pos="81000">
-                <a:schemeClr val="accent4">
-                  <a:alpha val="50000"/>
-                </a:schemeClr>
-              </a:gs>
-              <a:gs pos="25000">
-                <a:schemeClr val="accent2">
-                  <a:alpha val="60000"/>
-                </a:schemeClr>
-              </a:gs>
-              <a:gs pos="50000">
-                <a:schemeClr val="accent3">
-                  <a:alpha val="55000"/>
-                </a:schemeClr>
-              </a:gs>
-              <a:gs pos="99000">
-                <a:schemeClr val="accent5">
-                  <a:alpha val="50000"/>
-                </a:schemeClr>
-              </a:gs>
-            </a:gsLst>
-            <a:path path="circle">
-              <a:fillToRect r="100000" b="100000"/>
-            </a:path>
-            <a:tileRect l="-100000" t="-100000"/>
-          </a:gradFill>
-          <a:ln>
-            <a:noFill/>
-          </a:ln>
         </p:spPr>
-        <p:style>
-          <a:lnRef idx="2">
-            <a:schemeClr val="accent1">
-              <a:shade val="50000"/>
-            </a:schemeClr>
-          </a:lnRef>
-          <a:fillRef idx="1">
-            <a:schemeClr val="accent1"/>
-          </a:fillRef>
-          <a:effectRef idx="0">
-            <a:schemeClr val="accent1"/>
-          </a:effectRef>
-          <a:fontRef idx="minor">
-            <a:schemeClr val="lt1"/>
-          </a:fontRef>
-        </p:style>
-        <p:txBody>
-          <a:bodyPr rtlCol="0" anchor="ctr"/>
-          <a:lstStyle/>
-          <a:p>
-            <a:pPr lvl="0" algn="ctr"/>
-            <a:endParaRPr lang="en-US"/>
-          </a:p>
-        </p:txBody>
-      </p:sp>
-      <p:sp>
-        <p:nvSpPr>
-          <p:cNvPr id="26" name="Rectangle 25">
-            <a:extLst>
-              <a:ext uri="{FF2B5EF4-FFF2-40B4-BE49-F238E27FC236}">
-                <a16:creationId xmlns:a16="http://schemas.microsoft.com/office/drawing/2014/main" id="{08B44AFE-C181-7047-8CC9-CA00BD385EEA}"/>
-              </a:ext>
-              <a:ext uri="{C183D7F6-B498-43B3-948B-1728B52AA6E4}">
-                <adec:decorative xmlns:adec="http://schemas.microsoft.com/office/drawing/2017/decorative" val="1"/>
-              </a:ext>
-            </a:extLst>
-          </p:cNvPr>
-          <p:cNvSpPr>
-            <a:spLocks noGrp="1" noRot="1" noChangeAspect="1" noMove="1" noResize="1" noEditPoints="1" noAdjustHandles="1" noChangeArrowheads="1" noChangeShapeType="1" noTextEdit="1"/>
-          </p:cNvSpPr>
-          <p:nvPr>
-            <p:extLst>
-              <p:ext uri="{386F3935-93C4-4BCD-93E2-E3B085C9AB24}">
-                <p16:designElem xmlns:p16="http://schemas.microsoft.com/office/powerpoint/2015/main" val="1"/>
-              </p:ext>
-            </p:extLst>
-          </p:nvPr>
+      </p:pic>
+      <p:sp>
+        <p:nvSpPr>
+          <p:cNvPr id="4" name="TextBox 3">
+            <a:extLst>
+              <a:ext uri="{FF2B5EF4-FFF2-40B4-BE49-F238E27FC236}">
+                <a16:creationId xmlns:a16="http://schemas.microsoft.com/office/drawing/2014/main" id="{EE4C1488-3D03-16B9-2983-A6C5EC934500}"/>
+              </a:ext>
+            </a:extLst>
+          </p:cNvPr>
+          <p:cNvSpPr txBox="1"/>
+          <p:nvPr/>
         </p:nvSpPr>
         <p:spPr>
           <a:xfrm>
-            <a:off x="4740281" y="0"/>
-            <a:ext cx="1373567" cy="6857999"/>
+            <a:off x="2207045" y="843312"/>
+            <a:ext cx="7954178" cy="461665"/>
           </a:xfrm>
           <a:prstGeom prst="rect">
             <a:avLst/>
           </a:prstGeom>
-          <a:gradFill flip="none" rotWithShape="1">
-            <a:gsLst>
-              <a:gs pos="0">
-                <a:schemeClr val="accent1">
-                  <a:alpha val="50000"/>
-                </a:schemeClr>
-              </a:gs>
-              <a:gs pos="81000">
-                <a:schemeClr val="accent4">
-                  <a:alpha val="50000"/>
-                </a:schemeClr>
-              </a:gs>
-              <a:gs pos="25000">
-                <a:schemeClr val="accent2">
-                  <a:alpha val="60000"/>
-                </a:schemeClr>
-              </a:gs>
-              <a:gs pos="50000">
-                <a:schemeClr val="accent3">
-                  <a:alpha val="55000"/>
-                </a:schemeClr>
-              </a:gs>
-              <a:gs pos="99000">
-                <a:schemeClr val="accent5">
-                  <a:alpha val="50000"/>
-                </a:schemeClr>
-              </a:gs>
-            </a:gsLst>
-            <a:path path="circle">
-              <a:fillToRect r="100000" b="100000"/>
-            </a:path>
-            <a:tileRect l="-100000" t="-100000"/>
-          </a:gradFill>
-          <a:ln>
-            <a:noFill/>
-          </a:ln>
+          <a:noFill/>
         </p:spPr>
-        <p:style>
-          <a:lnRef idx="2">
-            <a:schemeClr val="accent1">
-              <a:shade val="50000"/>
-            </a:schemeClr>
-          </a:lnRef>
-          <a:fillRef idx="1">
-            <a:schemeClr val="accent1"/>
-          </a:fillRef>
-          <a:effectRef idx="0">
-            <a:schemeClr val="accent1"/>
-          </a:effectRef>
-          <a:fontRef idx="minor">
-            <a:schemeClr val="lt1"/>
-          </a:fontRef>
-        </p:style>
-        <p:txBody>
-          <a:bodyPr rtlCol="0" anchor="ctr"/>
+        <p:txBody>
+          <a:bodyPr wrap="square" rtlCol="0">
+            <a:spAutoFit/>
+          </a:bodyPr>
           <a:lstStyle/>
           <a:p>
-            <a:pPr lvl="0" algn="ctr"/>
-            <a:endParaRPr lang="en-US"/>
+            <a:pPr algn="ctr"/>
+            <a:r>
+              <a:rPr lang="en-US" sz="2400" dirty="0">
+                <a:latin typeface="Britannic Bold" panose="020B0903060703020204" pitchFamily="34" charset="77"/>
+              </a:rPr>
+              <a:t>Word cloud of the reviews with rating equal to 1</a:t>
+            </a:r>
           </a:p>
         </p:txBody>
       </p:sp>
     </p:spTree>
     <p:extLst>
       <p:ext uri="{BB962C8B-B14F-4D97-AF65-F5344CB8AC3E}">
-        <p14:creationId xmlns:p14="http://schemas.microsoft.com/office/powerpoint/2010/main" val="3917815640"/>
+        <p14:creationId xmlns:p14="http://schemas.microsoft.com/office/powerpoint/2010/main" val="2418782836"/>
+      </p:ext>
+    </p:extLst>
+  </p:cSld>
+  <p:clrMapOvr>
+    <a:masterClrMapping/>
+  </p:clrMapOvr>
+</p:sld>
+</file>
+
+<file path=ppt/slides/slide11.xml><?xml version="1.0" encoding="utf-8"?>
+<p:sld xmlns:a="http://schemas.openxmlformats.org/drawingml/2006/main" xmlns:r="http://schemas.openxmlformats.org/officeDocument/2006/relationships" xmlns:p="http://schemas.openxmlformats.org/presentationml/2006/main">
+  <p:cSld>
+    <p:spTree>
+      <p:nvGrpSpPr>
+        <p:cNvPr id="1" name=""/>
+        <p:cNvGrpSpPr/>
+        <p:nvPr/>
+      </p:nvGrpSpPr>
+      <p:grpSpPr>
+        <a:xfrm>
+          <a:off x="0" y="0"/>
+          <a:ext cx="0" cy="0"/>
+          <a:chOff x="0" y="0"/>
+          <a:chExt cx="0" cy="0"/>
+        </a:xfrm>
+      </p:grpSpPr>
+      <p:pic>
+        <p:nvPicPr>
+          <p:cNvPr id="3" name="Picture 2">
+            <a:extLst>
+              <a:ext uri="{FF2B5EF4-FFF2-40B4-BE49-F238E27FC236}">
+                <a16:creationId xmlns:a16="http://schemas.microsoft.com/office/drawing/2014/main" id="{CC08D63E-FEFF-022D-6286-D4B45201EC15}"/>
+              </a:ext>
+            </a:extLst>
+          </p:cNvPr>
+          <p:cNvPicPr>
+            <a:picLocks noChangeAspect="1"/>
+          </p:cNvPicPr>
+          <p:nvPr/>
+        </p:nvPicPr>
+        <p:blipFill>
+          <a:blip r:embed="rId2"/>
+          <a:stretch>
+            <a:fillRect/>
+          </a:stretch>
+        </p:blipFill>
+        <p:spPr>
+          <a:xfrm>
+            <a:off x="1773714" y="1597446"/>
+            <a:ext cx="9265185" cy="4671152"/>
+          </a:xfrm>
+          <a:prstGeom prst="rect">
+            <a:avLst/>
+          </a:prstGeom>
+        </p:spPr>
+      </p:pic>
+      <p:sp>
+        <p:nvSpPr>
+          <p:cNvPr id="4" name="TextBox 3">
+            <a:extLst>
+              <a:ext uri="{FF2B5EF4-FFF2-40B4-BE49-F238E27FC236}">
+                <a16:creationId xmlns:a16="http://schemas.microsoft.com/office/drawing/2014/main" id="{9848A53D-F332-71DB-2276-4C0BFC99C062}"/>
+              </a:ext>
+            </a:extLst>
+          </p:cNvPr>
+          <p:cNvSpPr txBox="1"/>
+          <p:nvPr/>
+        </p:nvSpPr>
+        <p:spPr>
+          <a:xfrm>
+            <a:off x="1597446" y="694063"/>
+            <a:ext cx="9694843" cy="461665"/>
+          </a:xfrm>
+          <a:prstGeom prst="rect">
+            <a:avLst/>
+          </a:prstGeom>
+          <a:noFill/>
+        </p:spPr>
+        <p:txBody>
+          <a:bodyPr wrap="square" rtlCol="0">
+            <a:spAutoFit/>
+          </a:bodyPr>
+          <a:lstStyle/>
+          <a:p>
+            <a:pPr algn="ctr"/>
+            <a:r>
+              <a:rPr lang="en-US" sz="2400" dirty="0">
+                <a:latin typeface="Britannic Bold" panose="020B0903060703020204" pitchFamily="34" charset="77"/>
+              </a:rPr>
+              <a:t>Word cloud of the reviews with rating equal to 10</a:t>
+            </a:r>
+          </a:p>
+        </p:txBody>
+      </p:sp>
+    </p:spTree>
+    <p:extLst>
+      <p:ext uri="{BB962C8B-B14F-4D97-AF65-F5344CB8AC3E}">
+        <p14:creationId xmlns:p14="http://schemas.microsoft.com/office/powerpoint/2010/main" val="4124361393"/>
+      </p:ext>
+    </p:extLst>
+  </p:cSld>
+  <p:clrMapOvr>
+    <a:masterClrMapping/>
+  </p:clrMapOvr>
+</p:sld>
+</file>
+
+<file path=ppt/slides/slide12.xml><?xml version="1.0" encoding="utf-8"?>
+<p:sld xmlns:a="http://schemas.openxmlformats.org/drawingml/2006/main" xmlns:r="http://schemas.openxmlformats.org/officeDocument/2006/relationships" xmlns:p="http://schemas.openxmlformats.org/presentationml/2006/main">
+  <p:cSld>
+    <p:spTree>
+      <p:nvGrpSpPr>
+        <p:cNvPr id="1" name=""/>
+        <p:cNvGrpSpPr/>
+        <p:nvPr/>
+      </p:nvGrpSpPr>
+      <p:grpSpPr>
+        <a:xfrm>
+          <a:off x="0" y="0"/>
+          <a:ext cx="0" cy="0"/>
+          <a:chOff x="0" y="0"/>
+          <a:chExt cx="0" cy="0"/>
+        </a:xfrm>
+      </p:grpSpPr>
+      <p:pic>
+        <p:nvPicPr>
+          <p:cNvPr id="3" name="Picture 2">
+            <a:extLst>
+              <a:ext uri="{FF2B5EF4-FFF2-40B4-BE49-F238E27FC236}">
+                <a16:creationId xmlns:a16="http://schemas.microsoft.com/office/drawing/2014/main" id="{034705D6-ADF9-19C0-A6FD-FD7103FFD78F}"/>
+              </a:ext>
+            </a:extLst>
+          </p:cNvPr>
+          <p:cNvPicPr>
+            <a:picLocks noChangeAspect="1"/>
+          </p:cNvPicPr>
+          <p:nvPr/>
+        </p:nvPicPr>
+        <p:blipFill>
+          <a:blip r:embed="rId2"/>
+          <a:stretch>
+            <a:fillRect/>
+          </a:stretch>
+        </p:blipFill>
+        <p:spPr>
+          <a:xfrm>
+            <a:off x="1850833" y="1591784"/>
+            <a:ext cx="9540607" cy="4784680"/>
+          </a:xfrm>
+          <a:prstGeom prst="rect">
+            <a:avLst/>
+          </a:prstGeom>
+        </p:spPr>
+      </p:pic>
+      <p:sp>
+        <p:nvSpPr>
+          <p:cNvPr id="4" name="TextBox 3">
+            <a:extLst>
+              <a:ext uri="{FF2B5EF4-FFF2-40B4-BE49-F238E27FC236}">
+                <a16:creationId xmlns:a16="http://schemas.microsoft.com/office/drawing/2014/main" id="{C6DDD9BE-B387-DD44-9A85-CD59BB623D69}"/>
+              </a:ext>
+            </a:extLst>
+          </p:cNvPr>
+          <p:cNvSpPr txBox="1"/>
+          <p:nvPr/>
+        </p:nvSpPr>
+        <p:spPr>
+          <a:xfrm>
+            <a:off x="1850833" y="738130"/>
+            <a:ext cx="9628743" cy="707886"/>
+          </a:xfrm>
+          <a:prstGeom prst="rect">
+            <a:avLst/>
+          </a:prstGeom>
+          <a:noFill/>
+        </p:spPr>
+        <p:txBody>
+          <a:bodyPr wrap="square" rtlCol="0">
+            <a:spAutoFit/>
+          </a:bodyPr>
+          <a:lstStyle/>
+          <a:p>
+            <a:pPr algn="ctr"/>
+            <a:r>
+              <a:rPr lang="en-IN" sz="2000" dirty="0">
+                <a:solidFill>
+                  <a:srgbClr val="D1D5DB"/>
+                </a:solidFill>
+                <a:latin typeface="Britannic Bold" panose="020B0903060703020204" pitchFamily="34" charset="77"/>
+              </a:rPr>
+              <a:t>This bar plot display </a:t>
+            </a:r>
+            <a:r>
+              <a:rPr lang="en-IN" sz="2000" b="0" i="0" dirty="0">
+                <a:solidFill>
+                  <a:srgbClr val="D1D5DB"/>
+                </a:solidFill>
+                <a:effectLst/>
+                <a:latin typeface="Britannic Bold" panose="020B0903060703020204" pitchFamily="34" charset="77"/>
+              </a:rPr>
+              <a:t>the mean ratings of drugs over different years. It's a good visualization to see how the average ratings have changed over time. </a:t>
+            </a:r>
+            <a:endParaRPr lang="en-US" sz="2000" dirty="0">
+              <a:latin typeface="Britannic Bold" panose="020B0903060703020204" pitchFamily="34" charset="77"/>
+            </a:endParaRPr>
+          </a:p>
+        </p:txBody>
+      </p:sp>
+    </p:spTree>
+    <p:extLst>
+      <p:ext uri="{BB962C8B-B14F-4D97-AF65-F5344CB8AC3E}">
+        <p14:creationId xmlns:p14="http://schemas.microsoft.com/office/powerpoint/2010/main" val="1828757018"/>
+      </p:ext>
+    </p:extLst>
+  </p:cSld>
+  <p:clrMapOvr>
+    <a:masterClrMapping/>
+  </p:clrMapOvr>
+</p:sld>
+</file>
+
+<file path=ppt/slides/slide13.xml><?xml version="1.0" encoding="utf-8"?>
+<p:sld xmlns:a="http://schemas.openxmlformats.org/drawingml/2006/main" xmlns:r="http://schemas.openxmlformats.org/officeDocument/2006/relationships" xmlns:p="http://schemas.openxmlformats.org/presentationml/2006/main">
+  <p:cSld>
+    <p:spTree>
+      <p:nvGrpSpPr>
+        <p:cNvPr id="1" name=""/>
+        <p:cNvGrpSpPr/>
+        <p:nvPr/>
+      </p:nvGrpSpPr>
+      <p:grpSpPr>
+        <a:xfrm>
+          <a:off x="0" y="0"/>
+          <a:ext cx="0" cy="0"/>
+          <a:chOff x="0" y="0"/>
+          <a:chExt cx="0" cy="0"/>
+        </a:xfrm>
+      </p:grpSpPr>
+      <p:pic>
+        <p:nvPicPr>
+          <p:cNvPr id="3" name="Picture 2">
+            <a:extLst>
+              <a:ext uri="{FF2B5EF4-FFF2-40B4-BE49-F238E27FC236}">
+                <a16:creationId xmlns:a16="http://schemas.microsoft.com/office/drawing/2014/main" id="{C4BC77AF-D2C7-70B6-F5C0-180BF7459A79}"/>
+              </a:ext>
+            </a:extLst>
+          </p:cNvPr>
+          <p:cNvPicPr>
+            <a:picLocks noChangeAspect="1"/>
+          </p:cNvPicPr>
+          <p:nvPr/>
+        </p:nvPicPr>
+        <p:blipFill>
+          <a:blip r:embed="rId2"/>
+          <a:stretch>
+            <a:fillRect/>
+          </a:stretch>
+        </p:blipFill>
+        <p:spPr>
+          <a:xfrm>
+            <a:off x="1355074" y="1841436"/>
+            <a:ext cx="10618960" cy="4129200"/>
+          </a:xfrm>
+          <a:prstGeom prst="rect">
+            <a:avLst/>
+          </a:prstGeom>
+        </p:spPr>
+      </p:pic>
+      <p:sp>
+        <p:nvSpPr>
+          <p:cNvPr id="4" name="TextBox 3">
+            <a:extLst>
+              <a:ext uri="{FF2B5EF4-FFF2-40B4-BE49-F238E27FC236}">
+                <a16:creationId xmlns:a16="http://schemas.microsoft.com/office/drawing/2014/main" id="{CDBDAC1F-18FD-E17F-BE8F-8A39C3431B83}"/>
+              </a:ext>
+            </a:extLst>
+          </p:cNvPr>
+          <p:cNvSpPr txBox="1"/>
+          <p:nvPr/>
+        </p:nvSpPr>
+        <p:spPr>
+          <a:xfrm>
+            <a:off x="1255923" y="638978"/>
+            <a:ext cx="10432973" cy="461665"/>
+          </a:xfrm>
+          <a:prstGeom prst="rect">
+            <a:avLst/>
+          </a:prstGeom>
+          <a:noFill/>
+        </p:spPr>
+        <p:txBody>
+          <a:bodyPr wrap="square" rtlCol="0">
+            <a:spAutoFit/>
+          </a:bodyPr>
+          <a:lstStyle/>
+          <a:p>
+            <a:pPr algn="ctr"/>
+            <a:r>
+              <a:rPr lang="en-US" sz="2400" dirty="0">
+                <a:latin typeface="Britannic Bold" panose="020B0903060703020204" pitchFamily="34" charset="77"/>
+              </a:rPr>
+              <a:t>This </a:t>
+            </a:r>
+            <a:r>
+              <a:rPr lang="en-US" sz="2400" dirty="0" err="1">
+                <a:latin typeface="Britannic Bold" panose="020B0903060703020204" pitchFamily="34" charset="77"/>
+              </a:rPr>
+              <a:t>barplot</a:t>
+            </a:r>
+            <a:r>
+              <a:rPr lang="en-US" sz="2400" dirty="0">
+                <a:latin typeface="Britannic Bold" panose="020B0903060703020204" pitchFamily="34" charset="77"/>
+              </a:rPr>
+              <a:t> show the top 10 conditions the people are suffering.</a:t>
+            </a:r>
+          </a:p>
+        </p:txBody>
+      </p:sp>
+    </p:spTree>
+    <p:extLst>
+      <p:ext uri="{BB962C8B-B14F-4D97-AF65-F5344CB8AC3E}">
+        <p14:creationId xmlns:p14="http://schemas.microsoft.com/office/powerpoint/2010/main" val="923491296"/>
+      </p:ext>
+    </p:extLst>
+  </p:cSld>
+  <p:clrMapOvr>
+    <a:masterClrMapping/>
+  </p:clrMapOvr>
+</p:sld>
+</file>
+
+<file path=ppt/slides/slide14.xml><?xml version="1.0" encoding="utf-8"?>
+<p:sld xmlns:a="http://schemas.openxmlformats.org/drawingml/2006/main" xmlns:r="http://schemas.openxmlformats.org/officeDocument/2006/relationships" xmlns:p="http://schemas.openxmlformats.org/presentationml/2006/main">
+  <p:cSld>
+    <p:spTree>
+      <p:nvGrpSpPr>
+        <p:cNvPr id="1" name=""/>
+        <p:cNvGrpSpPr/>
+        <p:nvPr/>
+      </p:nvGrpSpPr>
+      <p:grpSpPr>
+        <a:xfrm>
+          <a:off x="0" y="0"/>
+          <a:ext cx="0" cy="0"/>
+          <a:chOff x="0" y="0"/>
+          <a:chExt cx="0" cy="0"/>
+        </a:xfrm>
+      </p:grpSpPr>
+      <p:pic>
+        <p:nvPicPr>
+          <p:cNvPr id="3" name="Picture 2">
+            <a:extLst>
+              <a:ext uri="{FF2B5EF4-FFF2-40B4-BE49-F238E27FC236}">
+                <a16:creationId xmlns:a16="http://schemas.microsoft.com/office/drawing/2014/main" id="{F3C1B3FD-BF66-E956-D7BA-2DD42420A3F3}"/>
+              </a:ext>
+            </a:extLst>
+          </p:cNvPr>
+          <p:cNvPicPr>
+            <a:picLocks noChangeAspect="1"/>
+          </p:cNvPicPr>
+          <p:nvPr/>
+        </p:nvPicPr>
+        <p:blipFill>
+          <a:blip r:embed="rId2"/>
+          <a:stretch>
+            <a:fillRect/>
+          </a:stretch>
+        </p:blipFill>
+        <p:spPr>
+          <a:xfrm>
+            <a:off x="1817783" y="1817782"/>
+            <a:ext cx="9562641" cy="4650953"/>
+          </a:xfrm>
+          <a:prstGeom prst="rect">
+            <a:avLst/>
+          </a:prstGeom>
+        </p:spPr>
+      </p:pic>
+      <p:sp>
+        <p:nvSpPr>
+          <p:cNvPr id="4" name="TextBox 3">
+            <a:extLst>
+              <a:ext uri="{FF2B5EF4-FFF2-40B4-BE49-F238E27FC236}">
+                <a16:creationId xmlns:a16="http://schemas.microsoft.com/office/drawing/2014/main" id="{57CDA0B3-CCA5-D957-0749-86D6726D9A34}"/>
+              </a:ext>
+            </a:extLst>
+          </p:cNvPr>
+          <p:cNvSpPr txBox="1"/>
+          <p:nvPr/>
+        </p:nvSpPr>
+        <p:spPr>
+          <a:xfrm>
+            <a:off x="1608463" y="947451"/>
+            <a:ext cx="10124501" cy="738664"/>
+          </a:xfrm>
+          <a:prstGeom prst="rect">
+            <a:avLst/>
+          </a:prstGeom>
+          <a:noFill/>
+        </p:spPr>
+        <p:txBody>
+          <a:bodyPr wrap="square" rtlCol="0">
+            <a:spAutoFit/>
+          </a:bodyPr>
+          <a:lstStyle/>
+          <a:p>
+            <a:pPr algn="ctr"/>
+            <a:r>
+              <a:rPr lang="en-US" sz="2400" dirty="0">
+                <a:latin typeface="Britannic Bold" panose="020B0903060703020204" pitchFamily="34" charset="77"/>
+              </a:rPr>
+              <a:t>Drugs used for Birth Control</a:t>
+            </a:r>
+          </a:p>
+          <a:p>
+            <a:endParaRPr lang="en-US" dirty="0"/>
+          </a:p>
+        </p:txBody>
+      </p:sp>
+    </p:spTree>
+    <p:extLst>
+      <p:ext uri="{BB962C8B-B14F-4D97-AF65-F5344CB8AC3E}">
+        <p14:creationId xmlns:p14="http://schemas.microsoft.com/office/powerpoint/2010/main" val="2181018394"/>
+      </p:ext>
+    </p:extLst>
+  </p:cSld>
+  <p:clrMapOvr>
+    <a:masterClrMapping/>
+  </p:clrMapOvr>
+</p:sld>
+</file>
+
+<file path=ppt/slides/slide15.xml><?xml version="1.0" encoding="utf-8"?>
+<p:sld xmlns:a="http://schemas.openxmlformats.org/drawingml/2006/main" xmlns:r="http://schemas.openxmlformats.org/officeDocument/2006/relationships" xmlns:p="http://schemas.openxmlformats.org/presentationml/2006/main">
+  <p:cSld>
+    <p:spTree>
+      <p:nvGrpSpPr>
+        <p:cNvPr id="1" name=""/>
+        <p:cNvGrpSpPr/>
+        <p:nvPr/>
+      </p:nvGrpSpPr>
+      <p:grpSpPr>
+        <a:xfrm>
+          <a:off x="0" y="0"/>
+          <a:ext cx="0" cy="0"/>
+          <a:chOff x="0" y="0"/>
+          <a:chExt cx="0" cy="0"/>
+        </a:xfrm>
+      </p:grpSpPr>
+      <p:pic>
+        <p:nvPicPr>
+          <p:cNvPr id="3" name="Picture 2">
+            <a:extLst>
+              <a:ext uri="{FF2B5EF4-FFF2-40B4-BE49-F238E27FC236}">
+                <a16:creationId xmlns:a16="http://schemas.microsoft.com/office/drawing/2014/main" id="{5D086D2E-030F-4529-F5A2-6620CCBC3880}"/>
+              </a:ext>
+            </a:extLst>
+          </p:cNvPr>
+          <p:cNvPicPr>
+            <a:picLocks noChangeAspect="1"/>
+          </p:cNvPicPr>
+          <p:nvPr/>
+        </p:nvPicPr>
+        <p:blipFill>
+          <a:blip r:embed="rId2"/>
+          <a:stretch>
+            <a:fillRect/>
+          </a:stretch>
+        </p:blipFill>
+        <p:spPr>
+          <a:xfrm>
+            <a:off x="1447799" y="501650"/>
+            <a:ext cx="9591101" cy="5755931"/>
+          </a:xfrm>
+          <a:prstGeom prst="rect">
+            <a:avLst/>
+          </a:prstGeom>
+        </p:spPr>
+      </p:pic>
+    </p:spTree>
+    <p:extLst>
+      <p:ext uri="{BB962C8B-B14F-4D97-AF65-F5344CB8AC3E}">
+        <p14:creationId xmlns:p14="http://schemas.microsoft.com/office/powerpoint/2010/main" val="1863301550"/>
+      </p:ext>
+    </p:extLst>
+  </p:cSld>
+  <p:clrMapOvr>
+    <a:masterClrMapping/>
+  </p:clrMapOvr>
+</p:sld>
+</file>
+
+<file path=ppt/slides/slide16.xml><?xml version="1.0" encoding="utf-8"?>
+<p:sld xmlns:a="http://schemas.openxmlformats.org/drawingml/2006/main" xmlns:r="http://schemas.openxmlformats.org/officeDocument/2006/relationships" xmlns:p="http://schemas.openxmlformats.org/presentationml/2006/main">
+  <p:cSld>
+    <p:spTree>
+      <p:nvGrpSpPr>
+        <p:cNvPr id="1" name=""/>
+        <p:cNvGrpSpPr/>
+        <p:nvPr/>
+      </p:nvGrpSpPr>
+      <p:grpSpPr>
+        <a:xfrm>
+          <a:off x="0" y="0"/>
+          <a:ext cx="0" cy="0"/>
+          <a:chOff x="0" y="0"/>
+          <a:chExt cx="0" cy="0"/>
+        </a:xfrm>
+      </p:grpSpPr>
+      <p:pic>
+        <p:nvPicPr>
+          <p:cNvPr id="3" name="Picture 2">
+            <a:extLst>
+              <a:ext uri="{FF2B5EF4-FFF2-40B4-BE49-F238E27FC236}">
+                <a16:creationId xmlns:a16="http://schemas.microsoft.com/office/drawing/2014/main" id="{C6269BFF-C4D3-681F-E607-00123BD42529}"/>
+              </a:ext>
+            </a:extLst>
+          </p:cNvPr>
+          <p:cNvPicPr>
+            <a:picLocks noChangeAspect="1"/>
+          </p:cNvPicPr>
+          <p:nvPr/>
+        </p:nvPicPr>
+        <p:blipFill>
+          <a:blip r:embed="rId2"/>
+          <a:stretch>
+            <a:fillRect/>
+          </a:stretch>
+        </p:blipFill>
+        <p:spPr>
+          <a:xfrm>
+            <a:off x="2170322" y="1343064"/>
+            <a:ext cx="8317735" cy="4749264"/>
+          </a:xfrm>
+          <a:prstGeom prst="rect">
+            <a:avLst/>
+          </a:prstGeom>
+        </p:spPr>
+      </p:pic>
+      <p:sp>
+        <p:nvSpPr>
+          <p:cNvPr id="4" name="TextBox 3">
+            <a:extLst>
+              <a:ext uri="{FF2B5EF4-FFF2-40B4-BE49-F238E27FC236}">
+                <a16:creationId xmlns:a16="http://schemas.microsoft.com/office/drawing/2014/main" id="{B8976665-8997-97E8-7049-657BF1F8D42E}"/>
+              </a:ext>
+            </a:extLst>
+          </p:cNvPr>
+          <p:cNvSpPr txBox="1"/>
+          <p:nvPr/>
+        </p:nvSpPr>
+        <p:spPr>
+          <a:xfrm>
+            <a:off x="4373696" y="581006"/>
+            <a:ext cx="8460954" cy="461665"/>
+          </a:xfrm>
+          <a:prstGeom prst="rect">
+            <a:avLst/>
+          </a:prstGeom>
+          <a:noFill/>
+        </p:spPr>
+        <p:txBody>
+          <a:bodyPr wrap="square" rtlCol="0">
+            <a:spAutoFit/>
+          </a:bodyPr>
+          <a:lstStyle/>
+          <a:p>
+            <a:r>
+              <a:rPr lang="en-US" sz="2400" dirty="0">
+                <a:latin typeface="Britannic Bold" panose="020B0903060703020204" pitchFamily="34" charset="77"/>
+              </a:rPr>
+              <a:t>Visualization of Useful Counts</a:t>
+            </a:r>
+          </a:p>
+        </p:txBody>
+      </p:sp>
+    </p:spTree>
+    <p:extLst>
+      <p:ext uri="{BB962C8B-B14F-4D97-AF65-F5344CB8AC3E}">
+        <p14:creationId xmlns:p14="http://schemas.microsoft.com/office/powerpoint/2010/main" val="3313914805"/>
+      </p:ext>
+    </p:extLst>
+  </p:cSld>
+  <p:clrMapOvr>
+    <a:masterClrMapping/>
+  </p:clrMapOvr>
+</p:sld>
+</file>
+
+<file path=ppt/slides/slide17.xml><?xml version="1.0" encoding="utf-8"?>
+<p:sld xmlns:a="http://schemas.openxmlformats.org/drawingml/2006/main" xmlns:r="http://schemas.openxmlformats.org/officeDocument/2006/relationships" xmlns:p="http://schemas.openxmlformats.org/presentationml/2006/main">
+  <p:cSld>
+    <p:spTree>
+      <p:nvGrpSpPr>
+        <p:cNvPr id="1" name=""/>
+        <p:cNvGrpSpPr/>
+        <p:nvPr/>
+      </p:nvGrpSpPr>
+      <p:grpSpPr>
+        <a:xfrm>
+          <a:off x="0" y="0"/>
+          <a:ext cx="0" cy="0"/>
+          <a:chOff x="0" y="0"/>
+          <a:chExt cx="0" cy="0"/>
+        </a:xfrm>
+      </p:grpSpPr>
+      <p:pic>
+        <p:nvPicPr>
+          <p:cNvPr id="3" name="Picture 2">
+            <a:extLst>
+              <a:ext uri="{FF2B5EF4-FFF2-40B4-BE49-F238E27FC236}">
+                <a16:creationId xmlns:a16="http://schemas.microsoft.com/office/drawing/2014/main" id="{E68581F4-60A7-F7F6-1334-A8BA02DF5CCA}"/>
+              </a:ext>
+            </a:extLst>
+          </p:cNvPr>
+          <p:cNvPicPr>
+            <a:picLocks noChangeAspect="1"/>
+          </p:cNvPicPr>
+          <p:nvPr/>
+        </p:nvPicPr>
+        <p:blipFill>
+          <a:blip r:embed="rId2"/>
+          <a:stretch>
+            <a:fillRect/>
+          </a:stretch>
+        </p:blipFill>
+        <p:spPr>
+          <a:xfrm>
+            <a:off x="3619500" y="1339621"/>
+            <a:ext cx="4953000" cy="4597400"/>
+          </a:xfrm>
+          <a:prstGeom prst="rect">
+            <a:avLst/>
+          </a:prstGeom>
+        </p:spPr>
+      </p:pic>
+      <p:sp>
+        <p:nvSpPr>
+          <p:cNvPr id="4" name="TextBox 3">
+            <a:extLst>
+              <a:ext uri="{FF2B5EF4-FFF2-40B4-BE49-F238E27FC236}">
+                <a16:creationId xmlns:a16="http://schemas.microsoft.com/office/drawing/2014/main" id="{6EB6AEA0-EAAC-EC99-20F1-D9769F6C6A0F}"/>
+              </a:ext>
+            </a:extLst>
+          </p:cNvPr>
+          <p:cNvSpPr txBox="1"/>
+          <p:nvPr/>
+        </p:nvSpPr>
+        <p:spPr>
+          <a:xfrm>
+            <a:off x="2610998" y="594911"/>
+            <a:ext cx="7458419" cy="461665"/>
+          </a:xfrm>
+          <a:prstGeom prst="rect">
+            <a:avLst/>
+          </a:prstGeom>
+          <a:noFill/>
+        </p:spPr>
+        <p:txBody>
+          <a:bodyPr wrap="square" rtlCol="0">
+            <a:spAutoFit/>
+          </a:bodyPr>
+          <a:lstStyle/>
+          <a:p>
+            <a:pPr algn="ctr"/>
+            <a:r>
+              <a:rPr lang="en-US" sz="2400" dirty="0"/>
+              <a:t>Heatmap</a:t>
+            </a:r>
+            <a:r>
+              <a:rPr lang="en-US" dirty="0"/>
+              <a:t> </a:t>
+            </a:r>
+            <a:r>
+              <a:rPr lang="en-US" sz="2400" dirty="0"/>
+              <a:t>of</a:t>
+            </a:r>
+            <a:r>
+              <a:rPr lang="en-US" dirty="0"/>
+              <a:t> </a:t>
+            </a:r>
+            <a:r>
+              <a:rPr lang="en-US" sz="2400" dirty="0"/>
+              <a:t>the</a:t>
+            </a:r>
+            <a:r>
+              <a:rPr lang="en-US" dirty="0"/>
+              <a:t> </a:t>
+            </a:r>
+            <a:r>
+              <a:rPr lang="en-US" sz="2400" dirty="0"/>
+              <a:t>Correlation</a:t>
+            </a:r>
+            <a:r>
+              <a:rPr lang="en-US" dirty="0"/>
+              <a:t> </a:t>
+            </a:r>
+            <a:r>
+              <a:rPr lang="en-US" sz="2400" dirty="0"/>
+              <a:t>Matrix</a:t>
+            </a:r>
+          </a:p>
+        </p:txBody>
+      </p:sp>
+    </p:spTree>
+    <p:extLst>
+      <p:ext uri="{BB962C8B-B14F-4D97-AF65-F5344CB8AC3E}">
+        <p14:creationId xmlns:p14="http://schemas.microsoft.com/office/powerpoint/2010/main" val="3392176408"/>
+      </p:ext>
+    </p:extLst>
+  </p:cSld>
+  <p:clrMapOvr>
+    <a:masterClrMapping/>
+  </p:clrMapOvr>
+</p:sld>
+</file>
+
+<file path=ppt/slides/slide18.xml><?xml version="1.0" encoding="utf-8"?>
+<p:sld xmlns:a="http://schemas.openxmlformats.org/drawingml/2006/main" xmlns:r="http://schemas.openxmlformats.org/officeDocument/2006/relationships" xmlns:p="http://schemas.openxmlformats.org/presentationml/2006/main">
+  <p:cSld>
+    <p:spTree>
+      <p:nvGrpSpPr>
+        <p:cNvPr id="1" name=""/>
+        <p:cNvGrpSpPr/>
+        <p:nvPr/>
+      </p:nvGrpSpPr>
+      <p:grpSpPr>
+        <a:xfrm>
+          <a:off x="0" y="0"/>
+          <a:ext cx="0" cy="0"/>
+          <a:chOff x="0" y="0"/>
+          <a:chExt cx="0" cy="0"/>
+        </a:xfrm>
+      </p:grpSpPr>
+      <p:sp>
+        <p:nvSpPr>
+          <p:cNvPr id="5" name="Title 4">
+            <a:extLst>
+              <a:ext uri="{FF2B5EF4-FFF2-40B4-BE49-F238E27FC236}">
+                <a16:creationId xmlns:a16="http://schemas.microsoft.com/office/drawing/2014/main" id="{60AC08A9-F110-00C3-699F-0CD6D9C13C10}"/>
+              </a:ext>
+            </a:extLst>
+          </p:cNvPr>
+          <p:cNvSpPr>
+            <a:spLocks noGrp="1"/>
+          </p:cNvSpPr>
+          <p:nvPr>
+            <p:ph type="title"/>
+          </p:nvPr>
+        </p:nvSpPr>
+        <p:spPr/>
+        <p:txBody>
+          <a:bodyPr/>
+          <a:lstStyle/>
+          <a:p>
+            <a:r>
+              <a:rPr lang="en-US" dirty="0"/>
+              <a:t>NLP &amp; LABEL PREPROCESSING</a:t>
+            </a:r>
+          </a:p>
+        </p:txBody>
+      </p:sp>
+      <p:sp>
+        <p:nvSpPr>
+          <p:cNvPr id="7" name="Text Placeholder 6">
+            <a:extLst>
+              <a:ext uri="{FF2B5EF4-FFF2-40B4-BE49-F238E27FC236}">
+                <a16:creationId xmlns:a16="http://schemas.microsoft.com/office/drawing/2014/main" id="{14BA547F-AB00-C0A7-3E49-C730FFA32F63}"/>
+              </a:ext>
+            </a:extLst>
+          </p:cNvPr>
+          <p:cNvSpPr>
+            <a:spLocks noGrp="1"/>
+          </p:cNvSpPr>
+          <p:nvPr>
+            <p:ph type="body" idx="1"/>
+          </p:nvPr>
+        </p:nvSpPr>
+        <p:spPr/>
+        <p:txBody>
+          <a:bodyPr/>
+          <a:lstStyle/>
+          <a:p>
+            <a:r>
+              <a:rPr lang="en-US" dirty="0"/>
+              <a:t>NLP (Natural Language Preprocessing)</a:t>
+            </a:r>
+          </a:p>
+        </p:txBody>
+      </p:sp>
+      <p:sp>
+        <p:nvSpPr>
+          <p:cNvPr id="8" name="Content Placeholder 7">
+            <a:extLst>
+              <a:ext uri="{FF2B5EF4-FFF2-40B4-BE49-F238E27FC236}">
+                <a16:creationId xmlns:a16="http://schemas.microsoft.com/office/drawing/2014/main" id="{B8B6E944-FF9F-4045-51F4-6FA05CEC9A9D}"/>
+              </a:ext>
+            </a:extLst>
+          </p:cNvPr>
+          <p:cNvSpPr>
+            <a:spLocks noGrp="1"/>
+          </p:cNvSpPr>
+          <p:nvPr>
+            <p:ph sz="half" idx="2"/>
+          </p:nvPr>
+        </p:nvSpPr>
+        <p:spPr/>
+        <p:txBody>
+          <a:bodyPr/>
+          <a:lstStyle/>
+          <a:p>
+            <a:r>
+              <a:rPr lang="en-US" dirty="0"/>
+              <a:t>In this model NLP is used for following reason:-</a:t>
+            </a:r>
+          </a:p>
+          <a:p>
+            <a:r>
+              <a:rPr lang="en-US" dirty="0"/>
+              <a:t>Text Data Collection and Cleaning</a:t>
+            </a:r>
+          </a:p>
+          <a:p>
+            <a:r>
+              <a:rPr lang="en-US" dirty="0"/>
+              <a:t>Tokenization</a:t>
+            </a:r>
+          </a:p>
+          <a:p>
+            <a:r>
+              <a:rPr lang="en-US" dirty="0"/>
+              <a:t>Stemming</a:t>
+            </a:r>
+          </a:p>
+          <a:p>
+            <a:r>
+              <a:rPr lang="en-US" dirty="0" err="1"/>
+              <a:t>Stopwords</a:t>
+            </a:r>
+            <a:endParaRPr lang="en-US" dirty="0"/>
+          </a:p>
+        </p:txBody>
+      </p:sp>
+      <p:sp>
+        <p:nvSpPr>
+          <p:cNvPr id="9" name="Text Placeholder 8">
+            <a:extLst>
+              <a:ext uri="{FF2B5EF4-FFF2-40B4-BE49-F238E27FC236}">
+                <a16:creationId xmlns:a16="http://schemas.microsoft.com/office/drawing/2014/main" id="{8FB6C4D4-935C-C49D-933C-4AAC9A331DFC}"/>
+              </a:ext>
+            </a:extLst>
+          </p:cNvPr>
+          <p:cNvSpPr>
+            <a:spLocks noGrp="1"/>
+          </p:cNvSpPr>
+          <p:nvPr>
+            <p:ph type="body" sz="quarter" idx="3"/>
+          </p:nvPr>
+        </p:nvSpPr>
+        <p:spPr>
+          <a:xfrm>
+            <a:off x="6687214" y="2011680"/>
+            <a:ext cx="4425696" cy="576304"/>
+          </a:xfrm>
+        </p:spPr>
+        <p:txBody>
+          <a:bodyPr/>
+          <a:lstStyle/>
+          <a:p>
+            <a:r>
+              <a:rPr lang="en-US" dirty="0"/>
+              <a:t>LABEL PREPROCESSING</a:t>
+            </a:r>
+          </a:p>
+        </p:txBody>
+      </p:sp>
+      <p:sp>
+        <p:nvSpPr>
+          <p:cNvPr id="10" name="Content Placeholder 9">
+            <a:extLst>
+              <a:ext uri="{FF2B5EF4-FFF2-40B4-BE49-F238E27FC236}">
+                <a16:creationId xmlns:a16="http://schemas.microsoft.com/office/drawing/2014/main" id="{CFC9B7F8-7132-D5B9-57E4-76F2BE56DDBE}"/>
+              </a:ext>
+            </a:extLst>
+          </p:cNvPr>
+          <p:cNvSpPr>
+            <a:spLocks noGrp="1"/>
+          </p:cNvSpPr>
+          <p:nvPr>
+            <p:ph sz="quarter" idx="4"/>
+          </p:nvPr>
+        </p:nvSpPr>
+        <p:spPr/>
+        <p:txBody>
+          <a:bodyPr/>
+          <a:lstStyle/>
+          <a:p>
+            <a:r>
+              <a:rPr lang="en-US" dirty="0"/>
+              <a:t>For NLP tasks like classification, sentiment analysis we need to process labels.</a:t>
+            </a:r>
+          </a:p>
+          <a:p>
+            <a:r>
+              <a:rPr lang="en-US" dirty="0"/>
+              <a:t>Count Vectorization helps in preprocessing the labels.</a:t>
+            </a:r>
+          </a:p>
+          <a:p>
+            <a:r>
+              <a:rPr lang="en-US" dirty="0"/>
+              <a:t>Count vectorization converts the text data into numerical data.</a:t>
+            </a:r>
+          </a:p>
+        </p:txBody>
+      </p:sp>
+    </p:spTree>
+    <p:extLst>
+      <p:ext uri="{BB962C8B-B14F-4D97-AF65-F5344CB8AC3E}">
+        <p14:creationId xmlns:p14="http://schemas.microsoft.com/office/powerpoint/2010/main" val="3041961290"/>
+      </p:ext>
+    </p:extLst>
+  </p:cSld>
+  <p:clrMapOvr>
+    <a:masterClrMapping/>
+  </p:clrMapOvr>
+</p:sld>
+</file>
+
+<file path=ppt/slides/slide19.xml><?xml version="1.0" encoding="utf-8"?>
+<p:sld xmlns:a="http://schemas.openxmlformats.org/drawingml/2006/main" xmlns:r="http://schemas.openxmlformats.org/officeDocument/2006/relationships" xmlns:p="http://schemas.openxmlformats.org/presentationml/2006/main">
+  <p:cSld>
+    <p:spTree>
+      <p:nvGrpSpPr>
+        <p:cNvPr id="1" name=""/>
+        <p:cNvGrpSpPr/>
+        <p:nvPr/>
+      </p:nvGrpSpPr>
+      <p:grpSpPr>
+        <a:xfrm>
+          <a:off x="0" y="0"/>
+          <a:ext cx="0" cy="0"/>
+          <a:chOff x="0" y="0"/>
+          <a:chExt cx="0" cy="0"/>
+        </a:xfrm>
+      </p:grpSpPr>
+      <p:sp>
+        <p:nvSpPr>
+          <p:cNvPr id="2" name="Title 1">
+            <a:extLst>
+              <a:ext uri="{FF2B5EF4-FFF2-40B4-BE49-F238E27FC236}">
+                <a16:creationId xmlns:a16="http://schemas.microsoft.com/office/drawing/2014/main" id="{110A252E-5F6F-78E4-152A-4E6396CB4143}"/>
+              </a:ext>
+            </a:extLst>
+          </p:cNvPr>
+          <p:cNvSpPr>
+            <a:spLocks noGrp="1"/>
+          </p:cNvSpPr>
+          <p:nvPr>
+            <p:ph type="title"/>
+          </p:nvPr>
+        </p:nvSpPr>
+        <p:spPr/>
+        <p:txBody>
+          <a:bodyPr/>
+          <a:lstStyle/>
+          <a:p>
+            <a:r>
+              <a:rPr lang="en-US" dirty="0"/>
+              <a:t>Explanation</a:t>
+            </a:r>
+          </a:p>
+        </p:txBody>
+      </p:sp>
+      <p:sp>
+        <p:nvSpPr>
+          <p:cNvPr id="3" name="Content Placeholder 2">
+            <a:extLst>
+              <a:ext uri="{FF2B5EF4-FFF2-40B4-BE49-F238E27FC236}">
+                <a16:creationId xmlns:a16="http://schemas.microsoft.com/office/drawing/2014/main" id="{48B3F1A0-6326-A078-DA4F-26122B7325CB}"/>
+              </a:ext>
+            </a:extLst>
+          </p:cNvPr>
+          <p:cNvSpPr>
+            <a:spLocks noGrp="1"/>
+          </p:cNvSpPr>
+          <p:nvPr>
+            <p:ph idx="1"/>
+          </p:nvPr>
+        </p:nvSpPr>
+        <p:spPr/>
+        <p:txBody>
+          <a:bodyPr/>
+          <a:lstStyle/>
+          <a:p>
+            <a:r>
+              <a:rPr lang="en-US" dirty="0"/>
+              <a:t>Tokenization:- It helps in splitting the text into individual words or tokens.</a:t>
+            </a:r>
+          </a:p>
+          <a:p>
+            <a:r>
+              <a:rPr lang="en-US" dirty="0"/>
+              <a:t>Stop Word:- It helps in removing words which does not make any sense.</a:t>
+            </a:r>
+          </a:p>
+          <a:p>
+            <a:r>
+              <a:rPr lang="en-US" dirty="0"/>
+              <a:t>Stemming:-It helps in removing the prefixes and suffixes of a </a:t>
+            </a:r>
+            <a:r>
+              <a:rPr lang="en-US" dirty="0" err="1"/>
+              <a:t>word.for</a:t>
+            </a:r>
+            <a:r>
+              <a:rPr lang="en-US" dirty="0"/>
+              <a:t> </a:t>
+            </a:r>
+            <a:r>
+              <a:rPr lang="en-US" dirty="0" err="1"/>
+              <a:t>eg</a:t>
+            </a:r>
+            <a:r>
+              <a:rPr lang="en-US" dirty="0"/>
+              <a:t>; “Beautiful”--</a:t>
+            </a:r>
+            <a:r>
+              <a:rPr lang="en-US" dirty="0">
+                <a:sym typeface="Wingdings" pitchFamily="2" charset="2"/>
+              </a:rPr>
+              <a:t> “Beauty”</a:t>
+            </a:r>
+            <a:endParaRPr lang="en-US" dirty="0"/>
+          </a:p>
+          <a:p>
+            <a:pPr marL="0" indent="0">
+              <a:buNone/>
+            </a:pPr>
+            <a:endParaRPr lang="en-US" dirty="0"/>
+          </a:p>
+        </p:txBody>
+      </p:sp>
+    </p:spTree>
+    <p:extLst>
+      <p:ext uri="{BB962C8B-B14F-4D97-AF65-F5344CB8AC3E}">
+        <p14:creationId xmlns:p14="http://schemas.microsoft.com/office/powerpoint/2010/main" val="3520973057"/>
       </p:ext>
     </p:extLst>
   </p:cSld>
@@ -8693,6 +9559,274 @@
 </p:sld>
 </file>
 
+<file path=ppt/slides/slide20.xml><?xml version="1.0" encoding="utf-8"?>
+<p:sld xmlns:a="http://schemas.openxmlformats.org/drawingml/2006/main" xmlns:r="http://schemas.openxmlformats.org/officeDocument/2006/relationships" xmlns:p="http://schemas.openxmlformats.org/presentationml/2006/main">
+  <p:cSld>
+    <p:spTree>
+      <p:nvGrpSpPr>
+        <p:cNvPr id="1" name=""/>
+        <p:cNvGrpSpPr/>
+        <p:nvPr/>
+      </p:nvGrpSpPr>
+      <p:grpSpPr>
+        <a:xfrm>
+          <a:off x="0" y="0"/>
+          <a:ext cx="0" cy="0"/>
+          <a:chOff x="0" y="0"/>
+          <a:chExt cx="0" cy="0"/>
+        </a:xfrm>
+      </p:grpSpPr>
+      <p:pic>
+        <p:nvPicPr>
+          <p:cNvPr id="2050" name="Picture 2" descr="Patients Condition Classification Using Drug Reviews.pptx">
+            <a:extLst>
+              <a:ext uri="{FF2B5EF4-FFF2-40B4-BE49-F238E27FC236}">
+                <a16:creationId xmlns:a16="http://schemas.microsoft.com/office/drawing/2014/main" id="{41C6A163-4254-29DD-FA78-DFDC10D5CBCF}"/>
+              </a:ext>
+            </a:extLst>
+          </p:cNvPr>
+          <p:cNvPicPr>
+            <a:picLocks noChangeAspect="1" noChangeArrowheads="1"/>
+          </p:cNvPicPr>
+          <p:nvPr/>
+        </p:nvPicPr>
+        <p:blipFill>
+          <a:blip r:embed="rId2">
+            <a:extLst>
+              <a:ext uri="{28A0092B-C50C-407E-A947-70E740481C1C}">
+                <a14:useLocalDpi xmlns:a14="http://schemas.microsoft.com/office/drawing/2010/main" val="0"/>
+              </a:ext>
+            </a:extLst>
+          </a:blip>
+          <a:srcRect/>
+          <a:stretch>
+            <a:fillRect/>
+          </a:stretch>
+        </p:blipFill>
+        <p:spPr bwMode="auto">
+          <a:xfrm>
+            <a:off x="1488501" y="837282"/>
+            <a:ext cx="9781754" cy="5502236"/>
+          </a:xfrm>
+          <a:prstGeom prst="rect">
+            <a:avLst/>
+          </a:prstGeom>
+          <a:noFill/>
+          <a:extLst>
+            <a:ext uri="{909E8E84-426E-40DD-AFC4-6F175D3DCCD1}">
+              <a14:hiddenFill xmlns:a14="http://schemas.microsoft.com/office/drawing/2010/main">
+                <a:solidFill>
+                  <a:srgbClr val="FFFFFF"/>
+                </a:solidFill>
+              </a14:hiddenFill>
+            </a:ext>
+          </a:extLst>
+        </p:spPr>
+      </p:pic>
+    </p:spTree>
+    <p:extLst>
+      <p:ext uri="{BB962C8B-B14F-4D97-AF65-F5344CB8AC3E}">
+        <p14:creationId xmlns:p14="http://schemas.microsoft.com/office/powerpoint/2010/main" val="1895973895"/>
+      </p:ext>
+    </p:extLst>
+  </p:cSld>
+  <p:clrMapOvr>
+    <a:masterClrMapping/>
+  </p:clrMapOvr>
+</p:sld>
+</file>
+
+<file path=ppt/slides/slide21.xml><?xml version="1.0" encoding="utf-8"?>
+<p:sld xmlns:a="http://schemas.openxmlformats.org/drawingml/2006/main" xmlns:r="http://schemas.openxmlformats.org/officeDocument/2006/relationships" xmlns:p="http://schemas.openxmlformats.org/presentationml/2006/main">
+  <p:cSld>
+    <p:spTree>
+      <p:nvGrpSpPr>
+        <p:cNvPr id="1" name=""/>
+        <p:cNvGrpSpPr/>
+        <p:nvPr/>
+      </p:nvGrpSpPr>
+      <p:grpSpPr>
+        <a:xfrm>
+          <a:off x="0" y="0"/>
+          <a:ext cx="0" cy="0"/>
+          <a:chOff x="0" y="0"/>
+          <a:chExt cx="0" cy="0"/>
+        </a:xfrm>
+      </p:grpSpPr>
+      <p:sp>
+        <p:nvSpPr>
+          <p:cNvPr id="2" name="Title 1">
+            <a:extLst>
+              <a:ext uri="{FF2B5EF4-FFF2-40B4-BE49-F238E27FC236}">
+                <a16:creationId xmlns:a16="http://schemas.microsoft.com/office/drawing/2014/main" id="{DC0FB456-D95E-5AE0-69F9-430086AAAF1F}"/>
+              </a:ext>
+            </a:extLst>
+          </p:cNvPr>
+          <p:cNvSpPr>
+            <a:spLocks noGrp="1"/>
+          </p:cNvSpPr>
+          <p:nvPr>
+            <p:ph type="title"/>
+          </p:nvPr>
+        </p:nvSpPr>
+        <p:spPr/>
+        <p:txBody>
+          <a:bodyPr/>
+          <a:lstStyle/>
+          <a:p>
+            <a:endParaRPr lang="en-US"/>
+          </a:p>
+        </p:txBody>
+      </p:sp>
+      <p:sp>
+        <p:nvSpPr>
+          <p:cNvPr id="3" name="Content Placeholder 2">
+            <a:extLst>
+              <a:ext uri="{FF2B5EF4-FFF2-40B4-BE49-F238E27FC236}">
+                <a16:creationId xmlns:a16="http://schemas.microsoft.com/office/drawing/2014/main" id="{B524697B-47DF-E5CD-480D-00438C620759}"/>
+              </a:ext>
+            </a:extLst>
+          </p:cNvPr>
+          <p:cNvSpPr>
+            <a:spLocks noGrp="1"/>
+          </p:cNvSpPr>
+          <p:nvPr>
+            <p:ph idx="1"/>
+          </p:nvPr>
+        </p:nvSpPr>
+        <p:spPr/>
+        <p:txBody>
+          <a:bodyPr/>
+          <a:lstStyle/>
+          <a:p>
+            <a:r>
+              <a:rPr lang="en-US" dirty="0"/>
+              <a:t>We have used 4 models to test the data.</a:t>
+            </a:r>
+          </a:p>
+          <a:p>
+            <a:pPr marL="0" indent="0">
+              <a:buNone/>
+            </a:pPr>
+            <a:r>
+              <a:rPr lang="en-US" dirty="0"/>
+              <a:t> 1. Random Forest.</a:t>
+            </a:r>
+          </a:p>
+          <a:p>
+            <a:pPr marL="0" indent="0">
+              <a:buNone/>
+            </a:pPr>
+            <a:r>
+              <a:rPr lang="en-US" dirty="0"/>
+              <a:t> 2. KNN Classifiers</a:t>
+            </a:r>
+          </a:p>
+          <a:p>
+            <a:pPr marL="0" indent="0">
+              <a:buNone/>
+            </a:pPr>
+            <a:r>
+              <a:rPr lang="en-US" dirty="0"/>
+              <a:t> 3.Multinomial Naïve Bayes</a:t>
+            </a:r>
+          </a:p>
+          <a:p>
+            <a:pPr marL="0" indent="0">
+              <a:buNone/>
+            </a:pPr>
+            <a:r>
+              <a:rPr lang="en-US" dirty="0"/>
+              <a:t> 4. SGD Classifiers.</a:t>
+            </a:r>
+          </a:p>
+          <a:p>
+            <a:pPr marL="0" indent="0">
+              <a:buNone/>
+            </a:pPr>
+            <a:r>
+              <a:rPr lang="en-US" dirty="0"/>
+              <a:t>After trying all the models Random forest gave the best Accuracy on the given data.</a:t>
+            </a:r>
+            <a:br>
+              <a:rPr lang="en-US" dirty="0"/>
+            </a:br>
+            <a:endParaRPr lang="en-US" dirty="0"/>
+          </a:p>
+        </p:txBody>
+      </p:sp>
+    </p:spTree>
+    <p:extLst>
+      <p:ext uri="{BB962C8B-B14F-4D97-AF65-F5344CB8AC3E}">
+        <p14:creationId xmlns:p14="http://schemas.microsoft.com/office/powerpoint/2010/main" val="2390169184"/>
+      </p:ext>
+    </p:extLst>
+  </p:cSld>
+  <p:clrMapOvr>
+    <a:masterClrMapping/>
+  </p:clrMapOvr>
+</p:sld>
+</file>
+
+<file path=ppt/slides/slide22.xml><?xml version="1.0" encoding="utf-8"?>
+<p:sld xmlns:a="http://schemas.openxmlformats.org/drawingml/2006/main" xmlns:r="http://schemas.openxmlformats.org/officeDocument/2006/relationships" xmlns:p="http://schemas.openxmlformats.org/presentationml/2006/main">
+  <p:cSld>
+    <p:spTree>
+      <p:nvGrpSpPr>
+        <p:cNvPr id="1" name=""/>
+        <p:cNvGrpSpPr/>
+        <p:nvPr/>
+      </p:nvGrpSpPr>
+      <p:grpSpPr>
+        <a:xfrm>
+          <a:off x="0" y="0"/>
+          <a:ext cx="0" cy="0"/>
+          <a:chOff x="0" y="0"/>
+          <a:chExt cx="0" cy="0"/>
+        </a:xfrm>
+      </p:grpSpPr>
+      <p:pic>
+        <p:nvPicPr>
+          <p:cNvPr id="5" name="Picture 4">
+            <a:extLst>
+              <a:ext uri="{FF2B5EF4-FFF2-40B4-BE49-F238E27FC236}">
+                <a16:creationId xmlns:a16="http://schemas.microsoft.com/office/drawing/2014/main" id="{92FA66B8-A1AC-9972-368E-6A733721CA12}"/>
+              </a:ext>
+            </a:extLst>
+          </p:cNvPr>
+          <p:cNvPicPr>
+            <a:picLocks noChangeAspect="1"/>
+          </p:cNvPicPr>
+          <p:nvPr/>
+        </p:nvPicPr>
+        <p:blipFill rotWithShape="1">
+          <a:blip r:embed="rId2"/>
+          <a:srcRect b="4832"/>
+          <a:stretch/>
+        </p:blipFill>
+        <p:spPr>
+          <a:xfrm>
+            <a:off x="2419121" y="958468"/>
+            <a:ext cx="7772400" cy="5794872"/>
+          </a:xfrm>
+          <a:prstGeom prst="rect">
+            <a:avLst/>
+          </a:prstGeom>
+        </p:spPr>
+      </p:pic>
+    </p:spTree>
+    <p:extLst>
+      <p:ext uri="{BB962C8B-B14F-4D97-AF65-F5344CB8AC3E}">
+        <p14:creationId xmlns:p14="http://schemas.microsoft.com/office/powerpoint/2010/main" val="2234863730"/>
+      </p:ext>
+    </p:extLst>
+  </p:cSld>
+  <p:clrMapOvr>
+    <a:masterClrMapping/>
+  </p:clrMapOvr>
+</p:sld>
+</file>
+
 <file path=ppt/slides/slide3.xml><?xml version="1.0" encoding="utf-8"?>
 <p:sld xmlns:a="http://schemas.openxmlformats.org/drawingml/2006/main" xmlns:r="http://schemas.openxmlformats.org/officeDocument/2006/relationships" xmlns:p="http://schemas.openxmlformats.org/presentationml/2006/main">
   <p:cSld>
@@ -8797,13 +9931,8 @@
           <a:p>
             <a:r>
               <a:rPr lang="en-US" dirty="0"/>
-              <a:t>Limitations and </a:t>
-            </a:r>
-            <a:r>
-              <a:rPr lang="en-US"/>
-              <a:t>Future Works</a:t>
-            </a:r>
-            <a:endParaRPr lang="en-US" dirty="0"/>
+              <a:t>Limitations and Future Works</a:t>
+            </a:r>
           </a:p>
         </p:txBody>
       </p:sp>
@@ -8970,8 +10099,8 @@
           </p:nvPr>
         </p:nvGraphicFramePr>
         <p:xfrm>
-          <a:off x="1587710" y="2160016"/>
-          <a:ext cx="9486690" cy="3926152"/>
+          <a:off x="1587500" y="2160588"/>
+          <a:ext cx="9486900" cy="3925887"/>
         </p:xfrm>
         <a:graphic>
           <a:graphicData uri="http://schemas.openxmlformats.org/drawingml/2006/diagram">
@@ -9014,6 +10143,84 @@
           <p:cNvPr id="2" name="Title 1">
             <a:extLst>
               <a:ext uri="{FF2B5EF4-FFF2-40B4-BE49-F238E27FC236}">
+                <a16:creationId xmlns:a16="http://schemas.microsoft.com/office/drawing/2014/main" id="{DBD3C8E6-0A84-C397-278D-6B581FEF770E}"/>
+              </a:ext>
+            </a:extLst>
+          </p:cNvPr>
+          <p:cNvSpPr>
+            <a:spLocks noGrp="1"/>
+          </p:cNvSpPr>
+          <p:nvPr>
+            <p:ph type="title" idx="4294967295"/>
+          </p:nvPr>
+        </p:nvSpPr>
+        <p:spPr>
+          <a:xfrm>
+            <a:off x="2033071" y="2544896"/>
+            <a:ext cx="9486900" cy="2335576"/>
+          </a:xfrm>
+        </p:spPr>
+        <p:txBody>
+          <a:bodyPr/>
+          <a:lstStyle/>
+          <a:p>
+            <a:pPr algn="ctr"/>
+            <a:r>
+              <a:rPr lang="en-US" dirty="0"/>
+              <a:t>EXPLORATORY DATA ANALYSIS</a:t>
+            </a:r>
+            <a:br>
+              <a:rPr lang="en-US" dirty="0"/>
+            </a:br>
+            <a:r>
+              <a:rPr lang="en-US" dirty="0"/>
+              <a:t>VISUALIZATION</a:t>
+            </a:r>
+            <a:br>
+              <a:rPr lang="en-US" dirty="0"/>
+            </a:br>
+            <a:endParaRPr lang="en-US" dirty="0"/>
+          </a:p>
+        </p:txBody>
+      </p:sp>
+    </p:spTree>
+    <p:extLst>
+      <p:ext uri="{BB962C8B-B14F-4D97-AF65-F5344CB8AC3E}">
+        <p14:creationId xmlns:p14="http://schemas.microsoft.com/office/powerpoint/2010/main" val="1362541095"/>
+      </p:ext>
+    </p:extLst>
+  </p:cSld>
+  <p:clrMapOvr>
+    <a:masterClrMapping/>
+  </p:clrMapOvr>
+  <p:transition spd="slow">
+    <p:wipe/>
+  </p:transition>
+</p:sld>
+</file>
+
+<file path=ppt/slides/slide7.xml><?xml version="1.0" encoding="utf-8"?>
+<p:sld xmlns:a="http://schemas.openxmlformats.org/drawingml/2006/main" xmlns:r="http://schemas.openxmlformats.org/officeDocument/2006/relationships" xmlns:p="http://schemas.openxmlformats.org/presentationml/2006/main">
+  <p:cSld>
+    <p:spTree>
+      <p:nvGrpSpPr>
+        <p:cNvPr id="1" name=""/>
+        <p:cNvGrpSpPr/>
+        <p:nvPr/>
+      </p:nvGrpSpPr>
+      <p:grpSpPr>
+        <a:xfrm>
+          <a:off x="0" y="0"/>
+          <a:ext cx="0" cy="0"/>
+          <a:chOff x="0" y="0"/>
+          <a:chExt cx="0" cy="0"/>
+        </a:xfrm>
+      </p:grpSpPr>
+      <p:sp>
+        <p:nvSpPr>
+          <p:cNvPr id="2" name="Title 1">
+            <a:extLst>
+              <a:ext uri="{FF2B5EF4-FFF2-40B4-BE49-F238E27FC236}">
                 <a16:creationId xmlns:a16="http://schemas.microsoft.com/office/drawing/2014/main" id="{EA81FE11-3180-F05E-6C7C-B57B7EBF1E64}"/>
               </a:ext>
             </a:extLst>
@@ -9027,7 +10234,7 @@
         </p:nvSpPr>
         <p:spPr>
           <a:xfrm>
-            <a:off x="1587710" y="455362"/>
+            <a:off x="1367372" y="354364"/>
             <a:ext cx="9097414" cy="685069"/>
           </a:xfrm>
         </p:spPr>
@@ -9037,10 +10244,26 @@
           </a:bodyPr>
           <a:lstStyle/>
           <a:p>
-            <a:r>
-              <a:rPr lang="en-US" dirty="0"/>
-              <a:t>EDA</a:t>
-            </a:r>
+            <a:pPr algn="ctr">
+              <a:lnSpc>
+                <a:spcPct val="110000"/>
+              </a:lnSpc>
+              <a:spcBef>
+                <a:spcPts val="1200"/>
+              </a:spcBef>
+              <a:buClr>
+                <a:schemeClr val="accent1"/>
+              </a:buClr>
+            </a:pPr>
+            <a:r>
+              <a:rPr lang="en-IN" sz="2400" dirty="0">
+                <a:latin typeface="Britannic Bold" panose="020B0903060703020204" pitchFamily="34" charset="77"/>
+              </a:rPr>
+              <a:t>This bar plot is created  using Seaborn and Matplotlib to display the top 20 drugs with a 10/10 rating, showing the number of ratings each drug has received.</a:t>
+            </a:r>
+            <a:endParaRPr lang="en-US" sz="2400" dirty="0">
+              <a:latin typeface="Britannic Bold" panose="020B0903060703020204" pitchFamily="34" charset="77"/>
+            </a:endParaRPr>
           </a:p>
         </p:txBody>
       </p:sp>
@@ -9068,15 +10291,310 @@
         </p:blipFill>
         <p:spPr>
           <a:xfrm>
-            <a:off x="2129969" y="1217728"/>
-            <a:ext cx="7932062" cy="5285814"/>
+            <a:off x="2226688" y="1725233"/>
+            <a:ext cx="8301765" cy="4325781"/>
           </a:xfrm>
         </p:spPr>
       </p:pic>
+      <p:sp>
+        <p:nvSpPr>
+          <p:cNvPr id="6" name="TextBox 5">
+            <a:extLst>
+              <a:ext uri="{FF2B5EF4-FFF2-40B4-BE49-F238E27FC236}">
+                <a16:creationId xmlns:a16="http://schemas.microsoft.com/office/drawing/2014/main" id="{46658B79-9DB7-83F0-E060-81B5A31E3332}"/>
+              </a:ext>
+            </a:extLst>
+          </p:cNvPr>
+          <p:cNvSpPr txBox="1"/>
+          <p:nvPr/>
+        </p:nvSpPr>
+        <p:spPr>
+          <a:xfrm>
+            <a:off x="1367371" y="5949108"/>
+            <a:ext cx="10563895" cy="411331"/>
+          </a:xfrm>
+          <a:prstGeom prst="rect">
+            <a:avLst/>
+          </a:prstGeom>
+          <a:noFill/>
+        </p:spPr>
+        <p:txBody>
+          <a:bodyPr wrap="square" rtlCol="0">
+            <a:spAutoFit/>
+          </a:bodyPr>
+          <a:lstStyle/>
+          <a:p>
+            <a:pPr>
+              <a:lnSpc>
+                <a:spcPct val="110000"/>
+              </a:lnSpc>
+              <a:spcBef>
+                <a:spcPts val="1200"/>
+              </a:spcBef>
+              <a:buClr>
+                <a:schemeClr val="accent1"/>
+              </a:buClr>
+            </a:pPr>
+            <a:r>
+              <a:rPr lang="en-IN" sz="2000" dirty="0">
+                <a:latin typeface="IBM Plex Sans" panose="020B0503050203000203" pitchFamily="34" charset="0"/>
+              </a:rPr>
+              <a:t>T</a:t>
+            </a:r>
+            <a:endParaRPr lang="en-US" sz="2000" dirty="0">
+              <a:latin typeface="IBM Plex Sans" panose="020B0503050203000203" pitchFamily="34" charset="0"/>
+            </a:endParaRPr>
+          </a:p>
+        </p:txBody>
+      </p:sp>
     </p:spTree>
     <p:extLst>
       <p:ext uri="{BB962C8B-B14F-4D97-AF65-F5344CB8AC3E}">
         <p14:creationId xmlns:p14="http://schemas.microsoft.com/office/powerpoint/2010/main" val="2723584410"/>
+      </p:ext>
+    </p:extLst>
+  </p:cSld>
+  <p:clrMapOvr>
+    <a:masterClrMapping/>
+  </p:clrMapOvr>
+</p:sld>
+</file>
+
+<file path=ppt/slides/slide8.xml><?xml version="1.0" encoding="utf-8"?>
+<p:sld xmlns:a="http://schemas.openxmlformats.org/drawingml/2006/main" xmlns:r="http://schemas.openxmlformats.org/officeDocument/2006/relationships" xmlns:p="http://schemas.openxmlformats.org/presentationml/2006/main">
+  <p:cSld>
+    <p:spTree>
+      <p:nvGrpSpPr>
+        <p:cNvPr id="1" name=""/>
+        <p:cNvGrpSpPr/>
+        <p:nvPr/>
+      </p:nvGrpSpPr>
+      <p:grpSpPr>
+        <a:xfrm>
+          <a:off x="0" y="0"/>
+          <a:ext cx="0" cy="0"/>
+          <a:chOff x="0" y="0"/>
+          <a:chExt cx="0" cy="0"/>
+        </a:xfrm>
+      </p:grpSpPr>
+      <p:sp>
+        <p:nvSpPr>
+          <p:cNvPr id="14" name="Title 13">
+            <a:extLst>
+              <a:ext uri="{FF2B5EF4-FFF2-40B4-BE49-F238E27FC236}">
+                <a16:creationId xmlns:a16="http://schemas.microsoft.com/office/drawing/2014/main" id="{A3025EE3-D18D-E7A5-4644-7D7311DCC935}"/>
+              </a:ext>
+            </a:extLst>
+          </p:cNvPr>
+          <p:cNvSpPr>
+            <a:spLocks noGrp="1"/>
+          </p:cNvSpPr>
+          <p:nvPr>
+            <p:ph type="title"/>
+          </p:nvPr>
+        </p:nvSpPr>
+        <p:spPr>
+          <a:xfrm>
+            <a:off x="1587710" y="1627094"/>
+            <a:ext cx="1518561" cy="2716306"/>
+          </a:xfrm>
+        </p:spPr>
+        <p:txBody>
+          <a:bodyPr>
+            <a:normAutofit/>
+          </a:bodyPr>
+          <a:lstStyle/>
+          <a:p>
+            <a:br>
+              <a:rPr lang="en-US" sz="1600" dirty="0">
+                <a:latin typeface="IBM Plex Sans" panose="020B0503050203000203" pitchFamily="34" charset="0"/>
+              </a:rPr>
+            </a:br>
+            <a:endParaRPr lang="en-US" sz="1600" dirty="0"/>
+          </a:p>
+        </p:txBody>
+      </p:sp>
+      <p:pic>
+        <p:nvPicPr>
+          <p:cNvPr id="25" name="Picture 24">
+            <a:extLst>
+              <a:ext uri="{FF2B5EF4-FFF2-40B4-BE49-F238E27FC236}">
+                <a16:creationId xmlns:a16="http://schemas.microsoft.com/office/drawing/2014/main" id="{B7D03442-F406-76AF-5566-2547042A06DF}"/>
+              </a:ext>
+            </a:extLst>
+          </p:cNvPr>
+          <p:cNvPicPr>
+            <a:picLocks noChangeAspect="1"/>
+          </p:cNvPicPr>
+          <p:nvPr/>
+        </p:nvPicPr>
+        <p:blipFill>
+          <a:blip r:embed="rId2"/>
+          <a:stretch>
+            <a:fillRect/>
+          </a:stretch>
+        </p:blipFill>
+        <p:spPr>
+          <a:xfrm>
+            <a:off x="2346990" y="1314271"/>
+            <a:ext cx="7772400" cy="5287077"/>
+          </a:xfrm>
+          <a:prstGeom prst="rect">
+            <a:avLst/>
+          </a:prstGeom>
+        </p:spPr>
+      </p:pic>
+      <p:sp>
+        <p:nvSpPr>
+          <p:cNvPr id="26" name="TextBox 25">
+            <a:extLst>
+              <a:ext uri="{FF2B5EF4-FFF2-40B4-BE49-F238E27FC236}">
+                <a16:creationId xmlns:a16="http://schemas.microsoft.com/office/drawing/2014/main" id="{5CF976D7-8519-B391-8986-D92FDECD2694}"/>
+              </a:ext>
+            </a:extLst>
+          </p:cNvPr>
+          <p:cNvSpPr txBox="1"/>
+          <p:nvPr/>
+        </p:nvSpPr>
+        <p:spPr>
+          <a:xfrm>
+            <a:off x="2985086" y="603862"/>
+            <a:ext cx="7772400" cy="400110"/>
+          </a:xfrm>
+          <a:prstGeom prst="rect">
+            <a:avLst/>
+          </a:prstGeom>
+          <a:noFill/>
+        </p:spPr>
+        <p:txBody>
+          <a:bodyPr wrap="square" rtlCol="0">
+            <a:spAutoFit/>
+          </a:bodyPr>
+          <a:lstStyle/>
+          <a:p>
+            <a:r>
+              <a:rPr lang="en-US" sz="2000" dirty="0">
+                <a:latin typeface="Britannic Bold" panose="020B0903060703020204" pitchFamily="34" charset="77"/>
+              </a:rPr>
+              <a:t>This </a:t>
+            </a:r>
+            <a:r>
+              <a:rPr lang="en-US" sz="2000" dirty="0" err="1">
+                <a:latin typeface="Britannic Bold" panose="020B0903060703020204" pitchFamily="34" charset="77"/>
+              </a:rPr>
+              <a:t>barplot</a:t>
+            </a:r>
+            <a:r>
+              <a:rPr lang="en-US" sz="2000" dirty="0">
+                <a:latin typeface="Britannic Bold" panose="020B0903060703020204" pitchFamily="34" charset="77"/>
+              </a:rPr>
+              <a:t> shows the top 20 drugs with the 10/10 rating</a:t>
+            </a:r>
+          </a:p>
+        </p:txBody>
+      </p:sp>
+    </p:spTree>
+    <p:extLst>
+      <p:ext uri="{BB962C8B-B14F-4D97-AF65-F5344CB8AC3E}">
+        <p14:creationId xmlns:p14="http://schemas.microsoft.com/office/powerpoint/2010/main" val="73066312"/>
+      </p:ext>
+    </p:extLst>
+  </p:cSld>
+  <p:clrMapOvr>
+    <a:masterClrMapping/>
+  </p:clrMapOvr>
+</p:sld>
+</file>
+
+<file path=ppt/slides/slide9.xml><?xml version="1.0" encoding="utf-8"?>
+<p:sld xmlns:a="http://schemas.openxmlformats.org/drawingml/2006/main" xmlns:r="http://schemas.openxmlformats.org/officeDocument/2006/relationships" xmlns:p="http://schemas.openxmlformats.org/presentationml/2006/main">
+  <p:cSld>
+    <p:spTree>
+      <p:nvGrpSpPr>
+        <p:cNvPr id="1" name=""/>
+        <p:cNvGrpSpPr/>
+        <p:nvPr/>
+      </p:nvGrpSpPr>
+      <p:grpSpPr>
+        <a:xfrm>
+          <a:off x="0" y="0"/>
+          <a:ext cx="0" cy="0"/>
+          <a:chOff x="0" y="0"/>
+          <a:chExt cx="0" cy="0"/>
+        </a:xfrm>
+      </p:grpSpPr>
+      <p:pic>
+        <p:nvPicPr>
+          <p:cNvPr id="5" name="Picture 4">
+            <a:extLst>
+              <a:ext uri="{FF2B5EF4-FFF2-40B4-BE49-F238E27FC236}">
+                <a16:creationId xmlns:a16="http://schemas.microsoft.com/office/drawing/2014/main" id="{9CA2F74E-04CD-681A-AAF6-D1AE6A178437}"/>
+              </a:ext>
+            </a:extLst>
+          </p:cNvPr>
+          <p:cNvPicPr>
+            <a:picLocks noChangeAspect="1"/>
+          </p:cNvPicPr>
+          <p:nvPr/>
+        </p:nvPicPr>
+        <p:blipFill>
+          <a:blip r:embed="rId2"/>
+          <a:stretch>
+            <a:fillRect/>
+          </a:stretch>
+        </p:blipFill>
+        <p:spPr>
+          <a:xfrm>
+            <a:off x="2170323" y="1729649"/>
+            <a:ext cx="9518573" cy="4252510"/>
+          </a:xfrm>
+          <a:prstGeom prst="rect">
+            <a:avLst/>
+          </a:prstGeom>
+        </p:spPr>
+      </p:pic>
+      <p:sp>
+        <p:nvSpPr>
+          <p:cNvPr id="6" name="TextBox 5">
+            <a:extLst>
+              <a:ext uri="{FF2B5EF4-FFF2-40B4-BE49-F238E27FC236}">
+                <a16:creationId xmlns:a16="http://schemas.microsoft.com/office/drawing/2014/main" id="{A683A05B-1881-63BF-1B64-EE46D5DA2700}"/>
+              </a:ext>
+            </a:extLst>
+          </p:cNvPr>
+          <p:cNvSpPr txBox="1"/>
+          <p:nvPr/>
+        </p:nvSpPr>
+        <p:spPr>
+          <a:xfrm>
+            <a:off x="4247002" y="765673"/>
+            <a:ext cx="5365214" cy="461665"/>
+          </a:xfrm>
+          <a:prstGeom prst="rect">
+            <a:avLst/>
+          </a:prstGeom>
+          <a:noFill/>
+        </p:spPr>
+        <p:txBody>
+          <a:bodyPr wrap="square" rtlCol="0">
+            <a:spAutoFit/>
+          </a:bodyPr>
+          <a:lstStyle/>
+          <a:p>
+            <a:pPr algn="ctr"/>
+            <a:r>
+              <a:rPr lang="en-US" sz="2400" dirty="0">
+                <a:latin typeface="Britannic Bold" panose="020B0903060703020204" pitchFamily="34" charset="77"/>
+              </a:rPr>
+              <a:t>DISTRIBUTION OF THE RATING</a:t>
+            </a:r>
+          </a:p>
+        </p:txBody>
+      </p:sp>
+    </p:spTree>
+    <p:extLst>
+      <p:ext uri="{BB962C8B-B14F-4D97-AF65-F5344CB8AC3E}">
+        <p14:creationId xmlns:p14="http://schemas.microsoft.com/office/powerpoint/2010/main" val="2213255955"/>
       </p:ext>
     </p:extLst>
   </p:cSld>

</xml_diff>